<commit_message>
edited presentation a bit
</commit_message>
<xml_diff>
--- a/presentation.pptx
+++ b/presentation.pptx
@@ -11,11 +11,11 @@
     <p:sldId id="256" r:id="rId2"/>
     <p:sldId id="267" r:id="rId3"/>
     <p:sldId id="270" r:id="rId4"/>
-    <p:sldId id="271" r:id="rId5"/>
+    <p:sldId id="272" r:id="rId5"/>
     <p:sldId id="258" r:id="rId6"/>
     <p:sldId id="259" r:id="rId7"/>
     <p:sldId id="269" r:id="rId8"/>
-    <p:sldId id="272" r:id="rId9"/>
+    <p:sldId id="271" r:id="rId9"/>
     <p:sldId id="261" r:id="rId10"/>
     <p:sldId id="263" r:id="rId11"/>
     <p:sldId id="265" r:id="rId12"/>
@@ -210,7 +210,7 @@
           <a:p>
             <a:fld id="{0A24DC99-4584-9243-8227-88E4411C14D9}" type="datetimeFigureOut">
               <a:rPr lang="en-US" smtClean="0"/>
-              <a:t>9/16/16</a:t>
+              <a:t>9/16/2016</a:t>
             </a:fld>
             <a:endParaRPr lang="en-US"/>
           </a:p>
@@ -274,38 +274,37 @@
           <a:p>
             <a:pPr lvl="0"/>
             <a:r>
-              <a:rPr lang="en-US" smtClean="0"/>
+              <a:rPr lang="en-US"/>
               <a:t>Click to edit Master text styles</a:t>
             </a:r>
           </a:p>
           <a:p>
             <a:pPr lvl="1"/>
             <a:r>
-              <a:rPr lang="en-US" smtClean="0"/>
+              <a:rPr lang="en-US"/>
               <a:t>Second level</a:t>
             </a:r>
           </a:p>
           <a:p>
             <a:pPr lvl="2"/>
             <a:r>
-              <a:rPr lang="en-US" smtClean="0"/>
+              <a:rPr lang="en-US"/>
               <a:t>Third level</a:t>
             </a:r>
           </a:p>
           <a:p>
             <a:pPr lvl="3"/>
             <a:r>
-              <a:rPr lang="en-US" smtClean="0"/>
+              <a:rPr lang="en-US"/>
               <a:t>Fourth level</a:t>
             </a:r>
           </a:p>
           <a:p>
             <a:pPr lvl="4"/>
             <a:r>
-              <a:rPr lang="en-US" smtClean="0"/>
+              <a:rPr lang="en-US"/>
               <a:t>Fifth level</a:t>
             </a:r>
-            <a:endParaRPr lang="en-US"/>
           </a:p>
         </p:txBody>
       </p:sp>
@@ -692,7 +691,7 @@
           </a:lstStyle>
           <a:p>
             <a:r>
-              <a:rPr lang="en-US" smtClean="0"/>
+              <a:rPr lang="en-US"/>
               <a:t>Click to edit Master title style</a:t>
             </a:r>
             <a:endParaRPr lang="en-US" dirty="0"/>
@@ -764,7 +763,7 @@
           </a:lstStyle>
           <a:p>
             <a:r>
-              <a:rPr lang="en-US" smtClean="0"/>
+              <a:rPr lang="en-US"/>
               <a:t>Click to edit Master subtitle style</a:t>
             </a:r>
             <a:endParaRPr lang="en-US" dirty="0"/>
@@ -788,7 +787,7 @@
           <a:p>
             <a:fld id="{C844D2C0-41C2-43BC-8019-694385F02E35}" type="datetimeFigureOut">
               <a:rPr lang="en-US" smtClean="0"/>
-              <a:t>9/16/16</a:t>
+              <a:t>9/16/2016</a:t>
             </a:fld>
             <a:endParaRPr lang="en-US"/>
           </a:p>
@@ -884,13 +883,6 @@
   <p:clrMapOvr>
     <a:masterClrMapping/>
   </p:clrMapOvr>
-  <p:timing>
-    <p:tnLst>
-      <p:par>
-        <p:cTn id="1" dur="indefinite" restart="never" nodeType="tmRoot"/>
-      </p:par>
-    </p:tnLst>
-  </p:timing>
 </p:sldLayout>
 </file>
 
@@ -927,7 +919,7 @@
           <a:lstStyle/>
           <a:p>
             <a:r>
-              <a:rPr lang="en-US" smtClean="0"/>
+              <a:rPr lang="en-US"/>
               <a:t>Click to edit Master title style</a:t>
             </a:r>
             <a:endParaRPr lang="en-US" dirty="0"/>
@@ -951,35 +943,35 @@
           <a:p>
             <a:pPr lvl="0"/>
             <a:r>
-              <a:rPr lang="en-US" smtClean="0"/>
+              <a:rPr lang="en-US"/>
               <a:t>Click to edit Master text styles</a:t>
             </a:r>
           </a:p>
           <a:p>
             <a:pPr lvl="1"/>
             <a:r>
-              <a:rPr lang="en-US" smtClean="0"/>
+              <a:rPr lang="en-US"/>
               <a:t>Second level</a:t>
             </a:r>
           </a:p>
           <a:p>
             <a:pPr lvl="2"/>
             <a:r>
-              <a:rPr lang="en-US" smtClean="0"/>
+              <a:rPr lang="en-US"/>
               <a:t>Third level</a:t>
             </a:r>
           </a:p>
           <a:p>
             <a:pPr lvl="3"/>
             <a:r>
-              <a:rPr lang="en-US" smtClean="0"/>
+              <a:rPr lang="en-US"/>
               <a:t>Fourth level</a:t>
             </a:r>
           </a:p>
           <a:p>
             <a:pPr lvl="4"/>
             <a:r>
-              <a:rPr lang="en-US" smtClean="0"/>
+              <a:rPr lang="en-US"/>
               <a:t>Fifth level</a:t>
             </a:r>
             <a:endParaRPr lang="en-US" dirty="0"/>
@@ -1003,7 +995,7 @@
           <a:p>
             <a:fld id="{C844D2C0-41C2-43BC-8019-694385F02E35}" type="datetimeFigureOut">
               <a:rPr lang="en-US" smtClean="0"/>
-              <a:t>9/16/16</a:t>
+              <a:t>9/16/2016</a:t>
             </a:fld>
             <a:endParaRPr lang="en-US"/>
           </a:p>
@@ -1178,7 +1170,7 @@
           <a:lstStyle/>
           <a:p>
             <a:r>
-              <a:rPr lang="en-US" smtClean="0"/>
+              <a:rPr lang="en-US"/>
               <a:t>Click to edit Master title style</a:t>
             </a:r>
             <a:endParaRPr lang="en-US" dirty="0"/>
@@ -1207,35 +1199,35 @@
           <a:p>
             <a:pPr lvl="0"/>
             <a:r>
-              <a:rPr lang="en-US" smtClean="0"/>
+              <a:rPr lang="en-US"/>
               <a:t>Click to edit Master text styles</a:t>
             </a:r>
           </a:p>
           <a:p>
             <a:pPr lvl="1"/>
             <a:r>
-              <a:rPr lang="en-US" smtClean="0"/>
+              <a:rPr lang="en-US"/>
               <a:t>Second level</a:t>
             </a:r>
           </a:p>
           <a:p>
             <a:pPr lvl="2"/>
             <a:r>
-              <a:rPr lang="en-US" smtClean="0"/>
+              <a:rPr lang="en-US"/>
               <a:t>Third level</a:t>
             </a:r>
           </a:p>
           <a:p>
             <a:pPr lvl="3"/>
             <a:r>
-              <a:rPr lang="en-US" smtClean="0"/>
+              <a:rPr lang="en-US"/>
               <a:t>Fourth level</a:t>
             </a:r>
           </a:p>
           <a:p>
             <a:pPr lvl="4"/>
             <a:r>
-              <a:rPr lang="en-US" smtClean="0"/>
+              <a:rPr lang="en-US"/>
               <a:t>Fifth level</a:t>
             </a:r>
             <a:endParaRPr lang="en-US" dirty="0"/>
@@ -1259,7 +1251,7 @@
           <a:p>
             <a:fld id="{C844D2C0-41C2-43BC-8019-694385F02E35}" type="datetimeFigureOut">
               <a:rPr lang="en-US" smtClean="0"/>
-              <a:t>9/16/16</a:t>
+              <a:t>9/16/2016</a:t>
             </a:fld>
             <a:endParaRPr lang="en-US"/>
           </a:p>
@@ -1353,7 +1345,7 @@
           <a:lstStyle/>
           <a:p>
             <a:r>
-              <a:rPr lang="en-US" smtClean="0"/>
+              <a:rPr lang="en-US"/>
               <a:t>Click to edit Master title style</a:t>
             </a:r>
             <a:endParaRPr lang="en-US" dirty="0"/>
@@ -1377,35 +1369,35 @@
           <a:p>
             <a:pPr lvl="0"/>
             <a:r>
-              <a:rPr lang="en-US" smtClean="0"/>
+              <a:rPr lang="en-US"/>
               <a:t>Click to edit Master text styles</a:t>
             </a:r>
           </a:p>
           <a:p>
             <a:pPr lvl="1"/>
             <a:r>
-              <a:rPr lang="en-US" smtClean="0"/>
+              <a:rPr lang="en-US"/>
               <a:t>Second level</a:t>
             </a:r>
           </a:p>
           <a:p>
             <a:pPr lvl="2"/>
             <a:r>
-              <a:rPr lang="en-US" smtClean="0"/>
+              <a:rPr lang="en-US"/>
               <a:t>Third level</a:t>
             </a:r>
           </a:p>
           <a:p>
             <a:pPr lvl="3"/>
             <a:r>
-              <a:rPr lang="en-US" smtClean="0"/>
+              <a:rPr lang="en-US"/>
               <a:t>Fourth level</a:t>
             </a:r>
           </a:p>
           <a:p>
             <a:pPr lvl="4"/>
             <a:r>
-              <a:rPr lang="en-US" smtClean="0"/>
+              <a:rPr lang="en-US"/>
               <a:t>Fifth level</a:t>
             </a:r>
             <a:endParaRPr lang="en-US" dirty="0"/>
@@ -1429,7 +1421,7 @@
           <a:p>
             <a:fld id="{C844D2C0-41C2-43BC-8019-694385F02E35}" type="datetimeFigureOut">
               <a:rPr lang="en-US" smtClean="0"/>
-              <a:t>9/16/16</a:t>
+              <a:t>9/16/2016</a:t>
             </a:fld>
             <a:endParaRPr lang="en-US"/>
           </a:p>
@@ -1487,13 +1479,6 @@
   <p:clrMapOvr>
     <a:masterClrMapping/>
   </p:clrMapOvr>
-  <p:timing>
-    <p:tnLst>
-      <p:par>
-        <p:cTn id="1" dur="indefinite" restart="never" nodeType="tmRoot"/>
-      </p:par>
-    </p:tnLst>
-  </p:timing>
 </p:sldLayout>
 </file>
 
@@ -1627,7 +1612,7 @@
           </a:lstStyle>
           <a:p>
             <a:r>
-              <a:rPr lang="en-US" smtClean="0"/>
+              <a:rPr lang="en-US"/>
               <a:t>Click to edit Master title style</a:t>
             </a:r>
             <a:endParaRPr lang="en-US" dirty="0"/>
@@ -1748,7 +1733,7 @@
           <a:p>
             <a:pPr lvl="0"/>
             <a:r>
-              <a:rPr lang="en-US" smtClean="0"/>
+              <a:rPr lang="en-US"/>
               <a:t>Click to edit Master text styles</a:t>
             </a:r>
           </a:p>
@@ -1771,7 +1756,7 @@
           <a:p>
             <a:fld id="{C844D2C0-41C2-43BC-8019-694385F02E35}" type="datetimeFigureOut">
               <a:rPr lang="en-US" smtClean="0"/>
-              <a:t>9/16/16</a:t>
+              <a:t>9/16/2016</a:t>
             </a:fld>
             <a:endParaRPr lang="en-US"/>
           </a:p>
@@ -1867,13 +1852,6 @@
   <p:clrMapOvr>
     <a:masterClrMapping/>
   </p:clrMapOvr>
-  <p:timing>
-    <p:tnLst>
-      <p:par>
-        <p:cTn id="1" dur="indefinite" restart="never" nodeType="tmRoot"/>
-      </p:par>
-    </p:tnLst>
-  </p:timing>
 </p:sldLayout>
 </file>
 
@@ -1915,7 +1893,7 @@
           <a:lstStyle/>
           <a:p>
             <a:r>
-              <a:rPr lang="en-US" smtClean="0"/>
+              <a:rPr lang="en-US"/>
               <a:t>Click to edit Master title style</a:t>
             </a:r>
             <a:endParaRPr lang="en-US" dirty="0"/>
@@ -1944,35 +1922,35 @@
           <a:p>
             <a:pPr lvl="0"/>
             <a:r>
-              <a:rPr lang="en-US" smtClean="0"/>
+              <a:rPr lang="en-US"/>
               <a:t>Click to edit Master text styles</a:t>
             </a:r>
           </a:p>
           <a:p>
             <a:pPr lvl="1"/>
             <a:r>
-              <a:rPr lang="en-US" smtClean="0"/>
+              <a:rPr lang="en-US"/>
               <a:t>Second level</a:t>
             </a:r>
           </a:p>
           <a:p>
             <a:pPr lvl="2"/>
             <a:r>
-              <a:rPr lang="en-US" smtClean="0"/>
+              <a:rPr lang="en-US"/>
               <a:t>Third level</a:t>
             </a:r>
           </a:p>
           <a:p>
             <a:pPr lvl="3"/>
             <a:r>
-              <a:rPr lang="en-US" smtClean="0"/>
+              <a:rPr lang="en-US"/>
               <a:t>Fourth level</a:t>
             </a:r>
           </a:p>
           <a:p>
             <a:pPr lvl="4"/>
             <a:r>
-              <a:rPr lang="en-US" smtClean="0"/>
+              <a:rPr lang="en-US"/>
               <a:t>Fifth level</a:t>
             </a:r>
             <a:endParaRPr lang="en-US" dirty="0"/>
@@ -2001,35 +1979,35 @@
           <a:p>
             <a:pPr lvl="0"/>
             <a:r>
-              <a:rPr lang="en-US" smtClean="0"/>
+              <a:rPr lang="en-US"/>
               <a:t>Click to edit Master text styles</a:t>
             </a:r>
           </a:p>
           <a:p>
             <a:pPr lvl="1"/>
             <a:r>
-              <a:rPr lang="en-US" smtClean="0"/>
+              <a:rPr lang="en-US"/>
               <a:t>Second level</a:t>
             </a:r>
           </a:p>
           <a:p>
             <a:pPr lvl="2"/>
             <a:r>
-              <a:rPr lang="en-US" smtClean="0"/>
+              <a:rPr lang="en-US"/>
               <a:t>Third level</a:t>
             </a:r>
           </a:p>
           <a:p>
             <a:pPr lvl="3"/>
             <a:r>
-              <a:rPr lang="en-US" smtClean="0"/>
+              <a:rPr lang="en-US"/>
               <a:t>Fourth level</a:t>
             </a:r>
           </a:p>
           <a:p>
             <a:pPr lvl="4"/>
             <a:r>
-              <a:rPr lang="en-US" smtClean="0"/>
+              <a:rPr lang="en-US"/>
               <a:t>Fifth level</a:t>
             </a:r>
             <a:endParaRPr lang="en-US" dirty="0"/>
@@ -2053,7 +2031,7 @@
           <a:p>
             <a:fld id="{C844D2C0-41C2-43BC-8019-694385F02E35}" type="datetimeFigureOut">
               <a:rPr lang="en-US" smtClean="0"/>
-              <a:t>9/16/16</a:t>
+              <a:t>9/16/2016</a:t>
             </a:fld>
             <a:endParaRPr lang="en-US"/>
           </a:p>
@@ -2152,7 +2130,7 @@
           <a:lstStyle/>
           <a:p>
             <a:r>
-              <a:rPr lang="en-US" smtClean="0"/>
+              <a:rPr lang="en-US"/>
               <a:t>Click to edit Master title style</a:t>
             </a:r>
             <a:endParaRPr lang="en-US" dirty="0"/>
@@ -2224,7 +2202,7 @@
           <a:p>
             <a:pPr lvl="0"/>
             <a:r>
-              <a:rPr lang="en-US" smtClean="0"/>
+              <a:rPr lang="en-US"/>
               <a:t>Click to edit Master text styles</a:t>
             </a:r>
           </a:p>
@@ -2252,35 +2230,35 @@
           <a:p>
             <a:pPr lvl="0"/>
             <a:r>
-              <a:rPr lang="en-US" smtClean="0"/>
+              <a:rPr lang="en-US"/>
               <a:t>Click to edit Master text styles</a:t>
             </a:r>
           </a:p>
           <a:p>
             <a:pPr lvl="1"/>
             <a:r>
-              <a:rPr lang="en-US" smtClean="0"/>
+              <a:rPr lang="en-US"/>
               <a:t>Second level</a:t>
             </a:r>
           </a:p>
           <a:p>
             <a:pPr lvl="2"/>
             <a:r>
-              <a:rPr lang="en-US" smtClean="0"/>
+              <a:rPr lang="en-US"/>
               <a:t>Third level</a:t>
             </a:r>
           </a:p>
           <a:p>
             <a:pPr lvl="3"/>
             <a:r>
-              <a:rPr lang="en-US" smtClean="0"/>
+              <a:rPr lang="en-US"/>
               <a:t>Fourth level</a:t>
             </a:r>
           </a:p>
           <a:p>
             <a:pPr lvl="4"/>
             <a:r>
-              <a:rPr lang="en-US" smtClean="0"/>
+              <a:rPr lang="en-US"/>
               <a:t>Fifth level</a:t>
             </a:r>
             <a:endParaRPr lang="en-US" dirty="0"/>
@@ -2352,7 +2330,7 @@
           <a:p>
             <a:pPr lvl="0"/>
             <a:r>
-              <a:rPr lang="en-US" smtClean="0"/>
+              <a:rPr lang="en-US"/>
               <a:t>Click to edit Master text styles</a:t>
             </a:r>
           </a:p>
@@ -2380,35 +2358,35 @@
           <a:p>
             <a:pPr lvl="0"/>
             <a:r>
-              <a:rPr lang="en-US" smtClean="0"/>
+              <a:rPr lang="en-US"/>
               <a:t>Click to edit Master text styles</a:t>
             </a:r>
           </a:p>
           <a:p>
             <a:pPr lvl="1"/>
             <a:r>
-              <a:rPr lang="en-US" smtClean="0"/>
+              <a:rPr lang="en-US"/>
               <a:t>Second level</a:t>
             </a:r>
           </a:p>
           <a:p>
             <a:pPr lvl="2"/>
             <a:r>
-              <a:rPr lang="en-US" smtClean="0"/>
+              <a:rPr lang="en-US"/>
               <a:t>Third level</a:t>
             </a:r>
           </a:p>
           <a:p>
             <a:pPr lvl="3"/>
             <a:r>
-              <a:rPr lang="en-US" smtClean="0"/>
+              <a:rPr lang="en-US"/>
               <a:t>Fourth level</a:t>
             </a:r>
           </a:p>
           <a:p>
             <a:pPr lvl="4"/>
             <a:r>
-              <a:rPr lang="en-US" smtClean="0"/>
+              <a:rPr lang="en-US"/>
               <a:t>Fifth level</a:t>
             </a:r>
             <a:endParaRPr lang="en-US" dirty="0"/>
@@ -2432,7 +2410,7 @@
           <a:p>
             <a:fld id="{C844D2C0-41C2-43BC-8019-694385F02E35}" type="datetimeFigureOut">
               <a:rPr lang="en-US" smtClean="0"/>
-              <a:t>9/16/16</a:t>
+              <a:t>9/16/2016</a:t>
             </a:fld>
             <a:endParaRPr lang="en-US"/>
           </a:p>
@@ -2526,7 +2504,7 @@
           <a:lstStyle/>
           <a:p>
             <a:r>
-              <a:rPr lang="en-US" smtClean="0"/>
+              <a:rPr lang="en-US"/>
               <a:t>Click to edit Master title style</a:t>
             </a:r>
             <a:endParaRPr lang="en-US" dirty="0"/>
@@ -2550,7 +2528,7 @@
           <a:p>
             <a:fld id="{C844D2C0-41C2-43BC-8019-694385F02E35}" type="datetimeFigureOut">
               <a:rPr lang="en-US" smtClean="0"/>
-              <a:t>9/16/16</a:t>
+              <a:t>9/16/2016</a:t>
             </a:fld>
             <a:endParaRPr lang="en-US"/>
           </a:p>
@@ -2721,7 +2699,7 @@
           <a:p>
             <a:fld id="{C844D2C0-41C2-43BC-8019-694385F02E35}" type="datetimeFigureOut">
               <a:rPr lang="en-US" smtClean="0"/>
-              <a:t>9/16/16</a:t>
+              <a:t>9/16/2016</a:t>
             </a:fld>
             <a:endParaRPr lang="en-US"/>
           </a:p>
@@ -2914,7 +2892,7 @@
           </a:lstStyle>
           <a:p>
             <a:r>
-              <a:rPr lang="en-US" smtClean="0"/>
+              <a:rPr lang="en-US"/>
               <a:t>Click to edit Master title style</a:t>
             </a:r>
             <a:endParaRPr lang="en-US" dirty="0"/>
@@ -2943,35 +2921,35 @@
           <a:p>
             <a:pPr lvl="0"/>
             <a:r>
-              <a:rPr lang="en-US" smtClean="0"/>
+              <a:rPr lang="en-US"/>
               <a:t>Click to edit Master text styles</a:t>
             </a:r>
           </a:p>
           <a:p>
             <a:pPr lvl="1"/>
             <a:r>
-              <a:rPr lang="en-US" smtClean="0"/>
+              <a:rPr lang="en-US"/>
               <a:t>Second level</a:t>
             </a:r>
           </a:p>
           <a:p>
             <a:pPr lvl="2"/>
             <a:r>
-              <a:rPr lang="en-US" smtClean="0"/>
+              <a:rPr lang="en-US"/>
               <a:t>Third level</a:t>
             </a:r>
           </a:p>
           <a:p>
             <a:pPr lvl="3"/>
             <a:r>
-              <a:rPr lang="en-US" smtClean="0"/>
+              <a:rPr lang="en-US"/>
               <a:t>Fourth level</a:t>
             </a:r>
           </a:p>
           <a:p>
             <a:pPr lvl="4"/>
             <a:r>
-              <a:rPr lang="en-US" smtClean="0"/>
+              <a:rPr lang="en-US"/>
               <a:t>Fifth level</a:t>
             </a:r>
             <a:endParaRPr lang="en-US" dirty="0"/>
@@ -3043,7 +3021,7 @@
           <a:p>
             <a:pPr lvl="0"/>
             <a:r>
-              <a:rPr lang="en-US" smtClean="0"/>
+              <a:rPr lang="en-US"/>
               <a:t>Click to edit Master text styles</a:t>
             </a:r>
           </a:p>
@@ -3075,7 +3053,7 @@
           <a:p>
             <a:fld id="{C844D2C0-41C2-43BC-8019-694385F02E35}" type="datetimeFigureOut">
               <a:rPr lang="en-US" smtClean="0"/>
-              <a:t>9/16/16</a:t>
+              <a:t>9/16/2016</a:t>
             </a:fld>
             <a:endParaRPr lang="en-US"/>
           </a:p>
@@ -3281,7 +3259,7 @@
           </a:lstStyle>
           <a:p>
             <a:r>
-              <a:rPr lang="en-US" smtClean="0"/>
+              <a:rPr lang="en-US"/>
               <a:t>Click to edit Master title style</a:t>
             </a:r>
             <a:endParaRPr lang="en-US" dirty="0"/>
@@ -3351,7 +3329,7 @@
           </a:lstStyle>
           <a:p>
             <a:r>
-              <a:rPr lang="en-US" smtClean="0"/>
+              <a:rPr lang="en-US"/>
               <a:t>Drag picture to placeholder or click icon to add</a:t>
             </a:r>
             <a:endParaRPr lang="en-US" dirty="0"/>
@@ -3429,7 +3407,7 @@
           <a:p>
             <a:pPr lvl="0"/>
             <a:r>
-              <a:rPr lang="en-US" smtClean="0"/>
+              <a:rPr lang="en-US"/>
               <a:t>Click to edit Master text styles</a:t>
             </a:r>
           </a:p>
@@ -3452,7 +3430,7 @@
           <a:p>
             <a:fld id="{C844D2C0-41C2-43BC-8019-694385F02E35}" type="datetimeFigureOut">
               <a:rPr lang="en-US" smtClean="0"/>
-              <a:t>9/16/16</a:t>
+              <a:t>9/16/2016</a:t>
             </a:fld>
             <a:endParaRPr lang="en-US"/>
           </a:p>
@@ -3640,7 +3618,7 @@
           <a:lstStyle/>
           <a:p>
             <a:r>
-              <a:rPr lang="en-US" smtClean="0"/>
+              <a:rPr lang="en-US"/>
               <a:t>Click to edit Master title style</a:t>
             </a:r>
             <a:endParaRPr lang="en-US" dirty="0"/>
@@ -3674,35 +3652,35 @@
           <a:p>
             <a:pPr lvl="0"/>
             <a:r>
-              <a:rPr lang="en-US" smtClean="0"/>
+              <a:rPr lang="en-US"/>
               <a:t>Click to edit Master text styles</a:t>
             </a:r>
           </a:p>
           <a:p>
             <a:pPr lvl="1"/>
             <a:r>
-              <a:rPr lang="en-US" smtClean="0"/>
+              <a:rPr lang="en-US"/>
               <a:t>Second level</a:t>
             </a:r>
           </a:p>
           <a:p>
             <a:pPr lvl="2"/>
             <a:r>
-              <a:rPr lang="en-US" smtClean="0"/>
+              <a:rPr lang="en-US"/>
               <a:t>Third level</a:t>
             </a:r>
           </a:p>
           <a:p>
             <a:pPr lvl="3"/>
             <a:r>
-              <a:rPr lang="en-US" smtClean="0"/>
+              <a:rPr lang="en-US"/>
               <a:t>Fourth level</a:t>
             </a:r>
           </a:p>
           <a:p>
             <a:pPr lvl="4"/>
             <a:r>
-              <a:rPr lang="en-US" smtClean="0"/>
+              <a:rPr lang="en-US"/>
               <a:t>Fifth level</a:t>
             </a:r>
             <a:endParaRPr lang="en-US" dirty="0"/>
@@ -3742,7 +3720,7 @@
           <a:p>
             <a:fld id="{C844D2C0-41C2-43BC-8019-694385F02E35}" type="datetimeFigureOut">
               <a:rPr lang="en-US" smtClean="0"/>
-              <a:t>9/16/16</a:t>
+              <a:t>9/16/2016</a:t>
             </a:fld>
             <a:endParaRPr lang="en-US"/>
           </a:p>
@@ -4258,36 +4236,20 @@
               </a:rPr>
               <a:t>Intermediate Language </a:t>
             </a:r>
-            <a:r>
-              <a:rPr lang="en-US" sz="6000" b="1" cap="small" dirty="0" smtClean="0">
-                <a:solidFill>
-                  <a:schemeClr val="accent2"/>
-                </a:solidFill>
-              </a:rPr>
-              <a:t/>
-            </a:r>
             <a:br>
-              <a:rPr lang="en-US" sz="6000" b="1" cap="small" dirty="0" smtClean="0">
-                <a:solidFill>
-                  <a:schemeClr val="accent2"/>
-                </a:solidFill>
-              </a:rPr>
-            </a:br>
-            <a:r>
-              <a:rPr lang="en-US" sz="6000" b="1" cap="small" dirty="0" smtClean="0">
-                <a:solidFill>
-                  <a:schemeClr val="accent2"/>
-                </a:solidFill>
-              </a:rPr>
-              <a:t>for </a:t>
-            </a:r>
-            <a:r>
               <a:rPr lang="en-US" sz="6000" b="1" cap="small" dirty="0">
                 <a:solidFill>
                   <a:schemeClr val="accent2"/>
                 </a:solidFill>
               </a:rPr>
-              <a:t>JavaScript</a:t>
+            </a:br>
+            <a:r>
+              <a:rPr lang="en-US" sz="6000" b="1" cap="small" dirty="0">
+                <a:solidFill>
+                  <a:schemeClr val="accent2"/>
+                </a:solidFill>
+              </a:rPr>
+              <a:t>for JavaScript</a:t>
             </a:r>
           </a:p>
         </p:txBody>
@@ -4324,13 +4286,6 @@
   <p:clrMapOvr>
     <a:masterClrMapping/>
   </p:clrMapOvr>
-  <p:timing>
-    <p:tnLst>
-      <p:par>
-        <p:cTn id="1" dur="indefinite" restart="never" nodeType="tmRoot"/>
-      </p:par>
-    </p:tnLst>
-  </p:timing>
 </p:sld>
 </file>
 
@@ -4367,7 +4322,11 @@
           <a:lstStyle/>
           <a:p>
             <a:r>
-              <a:rPr lang="en-US" dirty="0"/>
+              <a:rPr lang="en-US" b="1" u="sng" dirty="0">
+                <a:solidFill>
+                  <a:schemeClr val="accent2"/>
+                </a:solidFill>
+              </a:rPr>
               <a:t>Array Library</a:t>
             </a:r>
           </a:p>
@@ -4450,7 +4409,11 @@
           <a:lstStyle/>
           <a:p>
             <a:r>
-              <a:rPr lang="en-US" dirty="0"/>
+              <a:rPr lang="en-US" b="1" u="sng" dirty="0">
+                <a:solidFill>
+                  <a:schemeClr val="accent2"/>
+                </a:solidFill>
+              </a:rPr>
               <a:t>Testing</a:t>
             </a:r>
           </a:p>
@@ -4472,31 +4435,26 @@
           <a:lstStyle/>
           <a:p>
             <a:r>
-              <a:rPr lang="en-US" dirty="0" smtClean="0"/>
+              <a:rPr lang="en-US" dirty="0"/>
               <a:t>Unit testing – how was it done?</a:t>
             </a:r>
           </a:p>
           <a:p>
             <a:r>
-              <a:rPr lang="en-US" dirty="0" smtClean="0"/>
+              <a:rPr lang="en-US" dirty="0"/>
               <a:t>Testing infrastructure – table</a:t>
             </a:r>
-            <a:endParaRPr lang="en-US" dirty="0" smtClean="0"/>
-          </a:p>
-          <a:p>
-            <a:r>
-              <a:rPr lang="en-US" dirty="0" smtClean="0"/>
+          </a:p>
+          <a:p>
+            <a:r>
+              <a:rPr lang="en-US" dirty="0"/>
               <a:t>String stuff</a:t>
             </a:r>
           </a:p>
           <a:p>
             <a:r>
-              <a:rPr lang="en-US" dirty="0" smtClean="0"/>
-              <a:t>Process </a:t>
-            </a:r>
-            <a:r>
               <a:rPr lang="en-US" dirty="0"/>
-              <a:t>(unit test + test suite)</a:t>
+              <a:t>Process (unit test + test suite)</a:t>
             </a:r>
           </a:p>
           <a:p>
@@ -4553,7 +4511,11 @@
           <a:lstStyle/>
           <a:p>
             <a:r>
-              <a:rPr lang="en-US" dirty="0"/>
+              <a:rPr lang="en-US" b="1" u="sng" dirty="0">
+                <a:solidFill>
+                  <a:schemeClr val="accent2"/>
+                </a:solidFill>
+              </a:rPr>
               <a:t>Testing results for String</a:t>
             </a:r>
           </a:p>
@@ -4627,18 +4589,13 @@
           <a:lstStyle/>
           <a:p>
             <a:r>
-              <a:rPr lang="en-US" b="1" u="sng" dirty="0" smtClean="0">
+              <a:rPr lang="en-US" b="1" u="sng" dirty="0">
                 <a:solidFill>
                   <a:schemeClr val="accent2"/>
                 </a:solidFill>
               </a:rPr>
               <a:t>Conclusions and Evaluation</a:t>
             </a:r>
-            <a:endParaRPr lang="en-US" b="1" u="sng" dirty="0">
-              <a:solidFill>
-                <a:schemeClr val="accent2"/>
-              </a:solidFill>
-            </a:endParaRPr>
           </a:p>
         </p:txBody>
       </p:sp>
@@ -4658,43 +4615,43 @@
           <a:lstStyle/>
           <a:p>
             <a:r>
-              <a:rPr lang="en-US" dirty="0" smtClean="0"/>
+              <a:rPr lang="en-US" dirty="0"/>
               <a:t>Implementation – what was it based on (standard, </a:t>
             </a:r>
             <a:r>
-              <a:rPr lang="en-US" dirty="0" err="1" smtClean="0"/>
+              <a:rPr lang="en-US" dirty="0" err="1"/>
               <a:t>opsem</a:t>
             </a:r>
             <a:r>
-              <a:rPr lang="en-US" dirty="0" smtClean="0"/>
+              <a:rPr lang="en-US" dirty="0"/>
               <a:t>)</a:t>
             </a:r>
           </a:p>
           <a:p>
             <a:r>
-              <a:rPr lang="en-US" dirty="0" smtClean="0"/>
+              <a:rPr lang="en-US" dirty="0"/>
               <a:t>JSIL – programming not difficult, resembling assembly, but debugging</a:t>
             </a:r>
             <a:r>
-              <a:rPr lang="is-IS" dirty="0" smtClean="0"/>
+              <a:rPr lang="is-IS" dirty="0"/>
               <a:t>…</a:t>
             </a:r>
           </a:p>
           <a:p>
             <a:r>
-              <a:rPr lang="is-IS" dirty="0" smtClean="0"/>
+              <a:rPr lang="is-IS" dirty="0"/>
               <a:t>Unit testing – greatly helped bug detection, reduced Test262 debugging time  (shame we didn’t keep them)</a:t>
             </a:r>
           </a:p>
           <a:p>
             <a:r>
-              <a:rPr lang="is-IS" dirty="0" smtClean="0"/>
+              <a:rPr lang="is-IS" dirty="0"/>
               <a:t>Test262 experience – takes time, tests complex, unsuited for intial debugging</a:t>
             </a:r>
           </a:p>
           <a:p>
             <a:r>
-              <a:rPr lang="is-IS" dirty="0" smtClean="0"/>
+              <a:rPr lang="is-IS" dirty="0"/>
               <a:t>Infrastructure - interface good, filtering, etc.</a:t>
             </a:r>
           </a:p>
@@ -4749,7 +4706,11 @@
           <a:lstStyle/>
           <a:p>
             <a:r>
-              <a:rPr lang="en-US" dirty="0"/>
+              <a:rPr lang="en-US" b="1" dirty="0">
+                <a:solidFill>
+                  <a:schemeClr val="accent2"/>
+                </a:solidFill>
+              </a:rPr>
               <a:t>Future Work</a:t>
             </a:r>
           </a:p>
@@ -4874,18 +4835,13 @@
           <a:lstStyle/>
           <a:p>
             <a:r>
-              <a:rPr lang="en-US" b="1" u="sng" dirty="0" smtClean="0">
+              <a:rPr lang="en-US" b="1" u="sng" dirty="0">
                 <a:solidFill>
                   <a:schemeClr val="accent2"/>
                 </a:solidFill>
               </a:rPr>
               <a:t>Context</a:t>
             </a:r>
-            <a:endParaRPr lang="en-US" b="1" u="sng" dirty="0">
-              <a:solidFill>
-                <a:schemeClr val="accent2"/>
-              </a:solidFill>
-            </a:endParaRPr>
           </a:p>
         </p:txBody>
       </p:sp>
@@ -4911,10 +4867,9 @@
           <a:lstStyle/>
           <a:p>
             <a:r>
-              <a:rPr lang="en-US" dirty="0" smtClean="0"/>
+              <a:rPr lang="en-US" dirty="0"/>
               <a:t>DIAGRAM!</a:t>
             </a:r>
-            <a:endParaRPr lang="en-US" dirty="0"/>
           </a:p>
         </p:txBody>
       </p:sp>
@@ -4928,13 +4883,6 @@
   <p:clrMapOvr>
     <a:masterClrMapping/>
   </p:clrMapOvr>
-  <p:timing>
-    <p:tnLst>
-      <p:par>
-        <p:cTn id="1" dur="indefinite" restart="never" nodeType="tmRoot"/>
-      </p:par>
-    </p:tnLst>
-  </p:timing>
 </p:sld>
 </file>
 
@@ -4965,29 +4913,19 @@
             <p:ph type="title"/>
           </p:nvPr>
         </p:nvSpPr>
-        <p:spPr>
-          <a:xfrm>
-            <a:off x="890016" y="298799"/>
-            <a:ext cx="10058400" cy="1450757"/>
-          </a:xfrm>
-        </p:spPr>
+        <p:spPr/>
         <p:txBody>
           <a:bodyPr/>
           <a:lstStyle/>
           <a:p>
             <a:r>
-              <a:rPr lang="en-US" b="1" u="sng" dirty="0" smtClean="0">
+              <a:rPr lang="en-US" b="1" u="sng" dirty="0">
                 <a:solidFill>
                   <a:schemeClr val="accent2"/>
                 </a:solidFill>
               </a:rPr>
               <a:t>Contributions</a:t>
             </a:r>
-            <a:endParaRPr lang="en-US" b="1" u="sng" dirty="0">
-              <a:solidFill>
-                <a:schemeClr val="accent2"/>
-              </a:solidFill>
-            </a:endParaRPr>
           </a:p>
         </p:txBody>
       </p:sp>
@@ -4998,13 +4936,13 @@
             <a:spLocks noGrp="1"/>
           </p:cNvSpPr>
           <p:nvPr>
-            <p:ph idx="1"/>
+            <p:ph sz="half" idx="1"/>
           </p:nvPr>
         </p:nvSpPr>
         <p:spPr>
           <a:xfrm>
-            <a:off x="975360" y="1945387"/>
-            <a:ext cx="9400032" cy="4077461"/>
+            <a:off x="6666059" y="1911637"/>
+            <a:ext cx="4937760" cy="4023359"/>
           </a:xfrm>
         </p:spPr>
         <p:txBody>
@@ -5014,62 +4952,88 @@
           <a:lstStyle/>
           <a:p>
             <a:r>
-              <a:rPr lang="en-US" dirty="0" smtClean="0"/>
+              <a:rPr lang="en-US" dirty="0"/>
               <a:t>ES5 Strict extensions</a:t>
             </a:r>
           </a:p>
           <a:p>
             <a:r>
-              <a:rPr lang="en-US" dirty="0" smtClean="0"/>
+              <a:rPr lang="en-US" dirty="0"/>
               <a:t>Arguments object</a:t>
             </a:r>
           </a:p>
           <a:p>
             <a:r>
-              <a:rPr lang="en-US" dirty="0" smtClean="0"/>
+              <a:rPr lang="en-US" dirty="0"/>
               <a:t>Libraries:</a:t>
             </a:r>
           </a:p>
           <a:p>
             <a:r>
-              <a:rPr lang="en-US" dirty="0" smtClean="0"/>
+              <a:rPr lang="en-US" dirty="0"/>
               <a:t>Array entire</a:t>
             </a:r>
           </a:p>
           <a:p>
             <a:r>
-              <a:rPr lang="en-US" dirty="0" err="1" smtClean="0"/>
+              <a:rPr lang="en-US" dirty="0" err="1"/>
               <a:t>Obj.proto</a:t>
             </a:r>
             <a:r>
-              <a:rPr lang="en-US" dirty="0" smtClean="0"/>
+              <a:rPr lang="en-US" dirty="0"/>
               <a:t> entire</a:t>
             </a:r>
           </a:p>
           <a:p>
             <a:r>
-              <a:rPr lang="en-US" dirty="0" smtClean="0"/>
+              <a:rPr lang="en-US" dirty="0"/>
               <a:t>String partial</a:t>
             </a:r>
           </a:p>
           <a:p>
             <a:r>
-              <a:rPr lang="en-US" dirty="0" smtClean="0"/>
+              <a:rPr lang="en-US" dirty="0"/>
               <a:t>JSIL implementation</a:t>
             </a:r>
           </a:p>
           <a:p>
             <a:r>
-              <a:rPr lang="en-US" dirty="0" smtClean="0"/>
+              <a:rPr lang="en-US" dirty="0"/>
               <a:t>Unit tests</a:t>
             </a:r>
           </a:p>
           <a:p>
             <a:r>
-              <a:rPr lang="en-US" dirty="0" smtClean="0"/>
+              <a:rPr lang="en-US" dirty="0"/>
               <a:t>Formal tests (Test262) for the String bit</a:t>
             </a:r>
-            <a:endParaRPr lang="en-US" dirty="0"/>
+          </a:p>
+        </p:txBody>
+      </p:sp>
+      <p:sp>
+        <p:nvSpPr>
+          <p:cNvPr id="3" name="Content Placeholder 2"/>
+          <p:cNvSpPr>
+            <a:spLocks noGrp="1"/>
+          </p:cNvSpPr>
+          <p:nvPr>
+            <p:ph sz="half" idx="2"/>
+          </p:nvPr>
+        </p:nvSpPr>
+        <p:spPr>
+          <a:xfrm>
+            <a:off x="1097280" y="1911637"/>
+            <a:ext cx="4937760" cy="4023360"/>
+          </a:xfrm>
+        </p:spPr>
+        <p:txBody>
+          <a:bodyPr/>
+          <a:lstStyle/>
+          <a:p>
+            <a:r>
+              <a:rPr lang="en-US" dirty="0"/>
+              <a:t>DIAGRAM</a:t>
+            </a:r>
           </a:p>
         </p:txBody>
       </p:sp>
@@ -5083,13 +5047,6 @@
   <p:clrMapOvr>
     <a:masterClrMapping/>
   </p:clrMapOvr>
-  <p:timing>
-    <p:tnLst>
-      <p:par>
-        <p:cTn id="1" dur="indefinite" restart="never" nodeType="tmRoot"/>
-      </p:par>
-    </p:tnLst>
-  </p:timing>
 </p:sld>
 </file>
 
@@ -5126,31 +5083,93 @@
           <a:lstStyle/>
           <a:p>
             <a:r>
-              <a:rPr lang="en-US" dirty="0" err="1" smtClean="0"/>
+              <a:rPr lang="en-US" b="1" u="sng" dirty="0" err="1">
+                <a:solidFill>
+                  <a:schemeClr val="accent2"/>
+                </a:solidFill>
+              </a:rPr>
               <a:t>Object.prototype.isPrototypeOf</a:t>
             </a:r>
-            <a:endParaRPr lang="en-US" dirty="0"/>
-          </a:p>
-        </p:txBody>
-      </p:sp>
-      <p:sp>
-        <p:nvSpPr>
-          <p:cNvPr id="3" name="Content Placeholder 2"/>
+            <a:endParaRPr lang="en-US" b="1" u="sng" dirty="0">
+              <a:solidFill>
+                <a:schemeClr val="accent2"/>
+              </a:solidFill>
+            </a:endParaRPr>
+          </a:p>
+        </p:txBody>
+      </p:sp>
+      <p:sp>
+        <p:nvSpPr>
+          <p:cNvPr id="5" name="Content Placeholder 4"/>
           <p:cNvSpPr>
             <a:spLocks noGrp="1"/>
           </p:cNvSpPr>
           <p:nvPr>
-            <p:ph idx="1"/>
+            <p:ph sz="half" idx="2"/>
           </p:nvPr>
         </p:nvSpPr>
         <p:spPr/>
+        <p:txBody>
+          <a:bodyPr>
+            <a:normAutofit/>
+          </a:bodyPr>
+          <a:lstStyle/>
+          <a:p>
+            <a:endParaRPr lang="en-US" dirty="0"/>
+          </a:p>
+        </p:txBody>
+      </p:sp>
+      <p:sp>
+        <p:nvSpPr>
+          <p:cNvPr id="7" name="Content Placeholder 6"/>
+          <p:cNvSpPr>
+            <a:spLocks noGrp="1"/>
+          </p:cNvSpPr>
+          <p:nvPr>
+            <p:ph sz="half" idx="1"/>
+          </p:nvPr>
+        </p:nvSpPr>
+        <p:spPr>
+          <a:xfrm>
+            <a:off x="1097280" y="1845735"/>
+            <a:ext cx="4937760" cy="4023359"/>
+          </a:xfrm>
+        </p:spPr>
         <p:txBody>
           <a:bodyPr/>
           <a:lstStyle/>
           <a:p>
             <a:r>
-              <a:rPr lang="en-US" dirty="0" smtClean="0"/>
-              <a:t>In words!</a:t>
+              <a:rPr lang="en-US" dirty="0"/>
+              <a:t>Purpose: to determine whether an object is in the prototype chain of another object</a:t>
+            </a:r>
+          </a:p>
+          <a:p>
+            <a:r>
+              <a:rPr lang="en-US" dirty="0"/>
+              <a:t>Syntax: </a:t>
+            </a:r>
+            <a:r>
+              <a:rPr lang="en-US" sz="1600" dirty="0" err="1">
+                <a:latin typeface="Courier"/>
+              </a:rPr>
+              <a:t>prototypeObject.isPrototypeOf</a:t>
+            </a:r>
+            <a:r>
+              <a:rPr lang="en-US" sz="1600" dirty="0">
+                <a:latin typeface="Courier"/>
+              </a:rPr>
+              <a:t>(object)</a:t>
+            </a:r>
+          </a:p>
+          <a:p>
+            <a:r>
+              <a:rPr lang="en-US" dirty="0"/>
+              <a:t>Return value: a Boolean indicating the result of prototype chain </a:t>
+            </a:r>
+            <a:r>
+              <a:rPr lang="en-US" dirty="0" err="1"/>
+              <a:t>seach</a:t>
             </a:r>
             <a:endParaRPr lang="en-US" dirty="0"/>
           </a:p>
@@ -5159,20 +5178,13 @@
     </p:spTree>
     <p:extLst>
       <p:ext uri="{BB962C8B-B14F-4D97-AF65-F5344CB8AC3E}">
-        <p14:creationId xmlns:p14="http://schemas.microsoft.com/office/powerpoint/2010/main" val="1748528465"/>
+        <p14:creationId xmlns:p14="http://schemas.microsoft.com/office/powerpoint/2010/main" val="1921277994"/>
       </p:ext>
     </p:extLst>
   </p:cSld>
   <p:clrMapOvr>
     <a:masterClrMapping/>
   </p:clrMapOvr>
-  <p:timing>
-    <p:tnLst>
-      <p:par>
-        <p:cTn id="1" dur="indefinite" restart="never" nodeType="tmRoot"/>
-      </p:par>
-    </p:tnLst>
-  </p:timing>
 </p:sld>
 </file>
 
@@ -5209,7 +5221,11 @@
           <a:lstStyle/>
           <a:p>
             <a:r>
-              <a:rPr lang="en-US" dirty="0"/>
+              <a:rPr lang="en-US" b="1" u="sng" dirty="0">
+                <a:solidFill>
+                  <a:schemeClr val="accent2"/>
+                </a:solidFill>
+              </a:rPr>
               <a:t>JavaScript Objects</a:t>
             </a:r>
           </a:p>
@@ -5231,8 +5247,28 @@
           <a:lstStyle/>
           <a:p>
             <a:r>
-              <a:rPr lang="en-US" dirty="0"/>
-              <a:t>An example:</a:t>
+              <a:rPr lang="en-US" dirty="0" err="1">
+                <a:latin typeface="Courier"/>
+              </a:rPr>
+              <a:t>var</a:t>
+            </a:r>
+            <a:r>
+              <a:rPr lang="en-US" dirty="0">
+                <a:latin typeface="Courier"/>
+              </a:rPr>
+              <a:t> </a:t>
+            </a:r>
+            <a:r>
+              <a:rPr lang="en-US" dirty="0" err="1">
+                <a:latin typeface="Courier"/>
+              </a:rPr>
+              <a:t>alice</a:t>
+            </a:r>
+            <a:r>
+              <a:rPr lang="en-US" dirty="0">
+                <a:latin typeface="Courier"/>
+              </a:rPr>
+              <a:t> = {name: "Alice", age: 36};</a:t>
             </a:r>
           </a:p>
           <a:p>
@@ -5249,6 +5285,12 @@
             <a:pPr marL="0" indent="0">
               <a:buNone/>
             </a:pPr>
+            <a:endParaRPr lang="en-US" dirty="0"/>
+          </a:p>
+          <a:p>
+            <a:pPr marL="0" indent="0">
+              <a:buNone/>
+            </a:pPr>
             <a:r>
               <a:rPr lang="en-US" dirty="0"/>
               <a:t>Talk about properties/descriptors/attributes</a:t>
@@ -5261,7 +5303,7 @@
       </p:sp>
       <p:pic>
         <p:nvPicPr>
-          <p:cNvPr id="4" name="Picture 3"/>
+          <p:cNvPr id="5" name="Picture 4"/>
           <p:cNvPicPr>
             <a:picLocks noChangeAspect="1"/>
           </p:cNvPicPr>
@@ -5281,8 +5323,8 @@
         </p:blipFill>
         <p:spPr>
           <a:xfrm>
-            <a:off x="3069040" y="2011680"/>
-            <a:ext cx="3779848" cy="1844200"/>
+            <a:off x="1355461" y="2198611"/>
+            <a:ext cx="1737511" cy="1554615"/>
           </a:xfrm>
           <a:prstGeom prst="rect">
             <a:avLst/>
@@ -5299,13 +5341,6 @@
   <p:clrMapOvr>
     <a:masterClrMapping/>
   </p:clrMapOvr>
-  <p:timing>
-    <p:tnLst>
-      <p:par>
-        <p:cTn id="1" dur="indefinite" restart="never" nodeType="tmRoot"/>
-      </p:par>
-    </p:tnLst>
-  </p:timing>
 </p:sld>
 </file>
 
@@ -5412,7 +5447,7 @@
           <a:lstStyle/>
           <a:p>
             <a:r>
-              <a:rPr lang="en-US" sz="2000" b="1" dirty="0" smtClean="0">
+              <a:rPr lang="en-US" sz="2000" b="1" dirty="0">
                 <a:solidFill>
                   <a:schemeClr val="accent2"/>
                 </a:solidFill>
@@ -5420,21 +5455,21 @@
               <a:t>Object field lookup: </a:t>
             </a:r>
             <a:r>
-              <a:rPr lang="en-US" sz="2000" b="1" dirty="0" err="1" smtClean="0">
+              <a:rPr lang="en-US" sz="2000" b="1" dirty="0" err="1">
                 <a:solidFill>
                   <a:schemeClr val="accent2"/>
                 </a:solidFill>
               </a:rPr>
               <a:t>o.x</a:t>
             </a:r>
-            <a:endParaRPr lang="en-US" sz="2000" b="1" dirty="0" smtClean="0">
+            <a:endParaRPr lang="en-US" sz="2000" b="1" dirty="0">
               <a:solidFill>
                 <a:schemeClr val="accent2"/>
               </a:solidFill>
             </a:endParaRPr>
           </a:p>
           <a:p>
-            <a:endParaRPr lang="en-US" sz="400" dirty="0" smtClean="0"/>
+            <a:endParaRPr lang="en-US" sz="400" dirty="0"/>
           </a:p>
           <a:p>
             <a:pPr marL="715963" indent="-454025">
@@ -5442,11 +5477,11 @@
               <a:buAutoNum type="arabicPeriod"/>
             </a:pPr>
             <a:r>
-              <a:rPr lang="en-US" dirty="0" smtClean="0"/>
+              <a:rPr lang="en-US" dirty="0"/>
               <a:t>Look for property </a:t>
             </a:r>
             <a:r>
-              <a:rPr lang="en-US" dirty="0" smtClean="0">
+              <a:rPr lang="en-US" dirty="0">
                 <a:latin typeface="Courier" charset="0"/>
                 <a:ea typeface="Courier" charset="0"/>
                 <a:cs typeface="Courier" charset="0"/>
@@ -5454,11 +5489,11 @@
               <a:t>x</a:t>
             </a:r>
             <a:r>
-              <a:rPr lang="en-US" dirty="0" smtClean="0"/>
+              <a:rPr lang="en-US" dirty="0"/>
               <a:t> in the object </a:t>
             </a:r>
             <a:r>
-              <a:rPr lang="en-US" dirty="0" smtClean="0">
+              <a:rPr lang="en-US" dirty="0">
                 <a:latin typeface="Courier" charset="0"/>
                 <a:ea typeface="Courier" charset="0"/>
                 <a:cs typeface="Courier" charset="0"/>
@@ -5466,7 +5501,7 @@
               <a:t>o</a:t>
             </a:r>
             <a:r>
-              <a:rPr lang="en-US" dirty="0" smtClean="0"/>
+              <a:rPr lang="en-US" dirty="0"/>
               <a:t>. If found, return its value.</a:t>
             </a:r>
           </a:p>
@@ -5476,7 +5511,7 @@
               <a:buAutoNum type="arabicPeriod"/>
             </a:pPr>
             <a:r>
-              <a:rPr lang="en-US" dirty="0" smtClean="0"/>
+              <a:rPr lang="en-US" dirty="0"/>
               <a:t>Otherwise, look for property x in the prototype of object o.</a:t>
             </a:r>
           </a:p>
@@ -5487,24 +5522,20 @@
             </a:pPr>
             <a:r>
               <a:rPr lang="en-US" dirty="0"/>
-              <a:t>A</a:t>
-            </a:r>
-            <a:r>
-              <a:rPr lang="en-US" dirty="0" smtClean="0"/>
-              <a:t>nd so on, until the end of the prototype chain</a:t>
+              <a:t>And so on, until the end of the prototype chain</a:t>
             </a:r>
             <a:r>
               <a:rPr lang="is-IS" dirty="0"/>
               <a:t>.</a:t>
             </a:r>
-            <a:endParaRPr lang="en-US" dirty="0" smtClean="0"/>
+            <a:endParaRPr lang="en-US" dirty="0"/>
           </a:p>
           <a:p>
             <a:pPr marL="285750" indent="-285750">
               <a:buFont typeface="Arial" charset="0"/>
               <a:buChar char="•"/>
             </a:pPr>
-            <a:endParaRPr lang="en-US" sz="2000" dirty="0" smtClean="0"/>
+            <a:endParaRPr lang="en-US" sz="2000" dirty="0"/>
           </a:p>
         </p:txBody>
       </p:sp>
@@ -5600,29 +5631,21 @@
                 <a:ea typeface="Courier" charset="0"/>
                 <a:cs typeface="Courier" charset="0"/>
               </a:rPr>
-              <a:t> = </a:t>
-            </a:r>
-            <a:r>
-              <a:rPr lang="en-US" sz="1700" dirty="0" smtClean="0">
+              <a:t> = true</a:t>
+            </a:r>
+          </a:p>
+          <a:p>
+            <a:pPr lvl="1"/>
+            <a:r>
+              <a:rPr lang="en-US" sz="1700" dirty="0" err="1">
                 <a:latin typeface="Courier" charset="0"/>
                 <a:ea typeface="Courier" charset="0"/>
                 <a:cs typeface="Courier" charset="0"/>
               </a:rPr>
-              <a:t>true</a:t>
-            </a:r>
-          </a:p>
-          <a:p>
-            <a:pPr lvl="1"/>
-            <a:r>
-              <a:rPr lang="en-US" sz="1700" dirty="0" err="1" smtClean="0">
-                <a:latin typeface="Courier" charset="0"/>
-                <a:ea typeface="Courier" charset="0"/>
-                <a:cs typeface="Courier" charset="0"/>
-              </a:rPr>
               <a:t>alice.weight</a:t>
             </a:r>
             <a:r>
-              <a:rPr lang="en-US" sz="1700" dirty="0" smtClean="0">
+              <a:rPr lang="en-US" sz="1700" dirty="0">
                 <a:latin typeface="Courier" charset="0"/>
                 <a:ea typeface="Courier" charset="0"/>
                 <a:cs typeface="Courier" charset="0"/>
@@ -5641,44 +5664,40 @@
           <a:p>
             <a:pPr lvl="1"/>
             <a:r>
-              <a:rPr lang="en-US" sz="1700" dirty="0" smtClean="0">
+              <a:rPr lang="en-US" sz="1700" dirty="0">
                 <a:ea typeface="Courier" charset="0"/>
                 <a:cs typeface="Courier" charset="0"/>
               </a:rPr>
               <a:t>All objects share the methods of </a:t>
             </a:r>
             <a:r>
-              <a:rPr lang="en-US" sz="1700" dirty="0" err="1" smtClean="0">
+              <a:rPr lang="en-US" sz="1700" dirty="0" err="1">
                 <a:ea typeface="Courier" charset="0"/>
                 <a:cs typeface="Courier" charset="0"/>
               </a:rPr>
               <a:t>Object.prototype</a:t>
             </a:r>
             <a:r>
-              <a:rPr lang="en-US" sz="1700" dirty="0" smtClean="0">
+              <a:rPr lang="en-US" sz="1700" dirty="0">
                 <a:ea typeface="Courier" charset="0"/>
                 <a:cs typeface="Courier" charset="0"/>
               </a:rPr>
               <a:t> (</a:t>
             </a:r>
             <a:r>
-              <a:rPr lang="en-US" sz="1700" dirty="0" err="1" smtClean="0">
+              <a:rPr lang="en-US" sz="1700" dirty="0" err="1">
                 <a:ea typeface="Courier" charset="0"/>
                 <a:cs typeface="Courier" charset="0"/>
               </a:rPr>
               <a:t>valueOf</a:t>
             </a:r>
             <a:r>
-              <a:rPr lang="en-US" sz="1700" dirty="0" smtClean="0">
+              <a:rPr lang="en-US" sz="1700" dirty="0">
                 <a:ea typeface="Courier" charset="0"/>
                 <a:cs typeface="Courier" charset="0"/>
               </a:rPr>
               <a:t>)</a:t>
             </a:r>
-            <a:endParaRPr lang="en-US" sz="1700" dirty="0">
-              <a:ea typeface="Courier" charset="0"/>
-              <a:cs typeface="Courier" charset="0"/>
-            </a:endParaRPr>
           </a:p>
         </p:txBody>
       </p:sp>
@@ -5692,13 +5711,6 @@
   <p:clrMapOvr>
     <a:masterClrMapping/>
   </p:clrMapOvr>
-  <p:timing>
-    <p:tnLst>
-      <p:par>
-        <p:cTn id="1" dur="indefinite" restart="never" nodeType="tmRoot"/>
-      </p:par>
-    </p:tnLst>
-  </p:timing>
 </p:sld>
 </file>
 
@@ -5747,7 +5759,7 @@
               </a:spcAft>
             </a:pPr>
             <a:r>
-              <a:rPr lang="en-US" sz="2000" b="1" dirty="0" smtClean="0">
+              <a:rPr lang="en-US" sz="2000" b="1" dirty="0">
                 <a:solidFill>
                   <a:schemeClr val="accent2"/>
                 </a:solidFill>
@@ -5755,7 +5767,7 @@
               <a:t>✓</a:t>
             </a:r>
             <a:r>
-              <a:rPr lang="en-US" sz="2000" dirty="0" smtClean="0"/>
+              <a:rPr lang="en-US" sz="2000" dirty="0"/>
               <a:t> Extensible objects</a:t>
             </a:r>
           </a:p>
@@ -5774,7 +5786,7 @@
               <a:t>✓</a:t>
             </a:r>
             <a:r>
-              <a:rPr lang="en-US" sz="2000" dirty="0" smtClean="0"/>
+              <a:rPr lang="en-US" sz="2000" dirty="0"/>
               <a:t> Dynamic field access</a:t>
             </a:r>
           </a:p>
@@ -5793,7 +5805,7 @@
               <a:t>✓</a:t>
             </a:r>
             <a:r>
-              <a:rPr lang="en-US" sz="2000" dirty="0" smtClean="0"/>
+              <a:rPr lang="en-US" sz="2000" dirty="0"/>
               <a:t> Dynamic procedure calls</a:t>
             </a:r>
           </a:p>
@@ -5804,7 +5816,7 @@
               </a:spcAft>
             </a:pPr>
             <a:r>
-              <a:rPr lang="en-US" sz="2000" b="1" dirty="0" smtClean="0">
+              <a:rPr lang="en-US" sz="2000" b="1" dirty="0">
                 <a:solidFill>
                   <a:schemeClr val="accent2"/>
                 </a:solidFill>
@@ -5812,7 +5824,7 @@
               <a:t>✓</a:t>
             </a:r>
             <a:r>
-              <a:rPr lang="en-US" sz="2000" dirty="0" smtClean="0"/>
+              <a:rPr lang="en-US" sz="2000" dirty="0"/>
               <a:t> Top-level procedures</a:t>
             </a:r>
           </a:p>
@@ -5887,18 +5899,13 @@
           <a:p>
             <a:pPr algn="ctr"/>
             <a:r>
-              <a:rPr lang="en-US" sz="4100" b="1" u="sng" dirty="0" smtClean="0">
+              <a:rPr lang="en-US" sz="4100" b="1" u="sng" dirty="0">
                 <a:solidFill>
                   <a:schemeClr val="accent2"/>
                 </a:solidFill>
               </a:rPr>
               <a:t>JSIL: An Intermediate Language for JS Verification</a:t>
             </a:r>
-            <a:endParaRPr lang="en-US" sz="4100" b="1" u="sng" dirty="0">
-              <a:solidFill>
-                <a:schemeClr val="accent2"/>
-              </a:solidFill>
-            </a:endParaRPr>
           </a:p>
         </p:txBody>
       </p:sp>
@@ -5926,7 +5933,7 @@
           <a:p>
             <a:pPr algn="ctr"/>
             <a:r>
-              <a:rPr lang="en-US" sz="2000" b="1" dirty="0" smtClean="0">
+              <a:rPr lang="en-US" sz="2000" b="1" dirty="0">
                 <a:solidFill>
                   <a:schemeClr val="accent2"/>
                 </a:solidFill>
@@ -5934,7 +5941,7 @@
               <a:t>Basic commands (</a:t>
             </a:r>
             <a:r>
-              <a:rPr lang="en-US" b="1" dirty="0" err="1" smtClean="0">
+              <a:rPr lang="en-US" b="1" dirty="0" err="1">
                 <a:solidFill>
                   <a:schemeClr val="accent2"/>
                 </a:solidFill>
@@ -5945,7 +5952,7 @@
               <a:t>bc</a:t>
             </a:r>
             <a:r>
-              <a:rPr lang="en-US" sz="2000" b="1" dirty="0" smtClean="0">
+              <a:rPr lang="en-US" sz="2000" b="1" dirty="0">
                 <a:solidFill>
                   <a:schemeClr val="accent2"/>
                 </a:solidFill>
@@ -5955,40 +5962,7 @@
           </a:p>
           <a:p>
             <a:pPr algn="ctr"/>
-            <a:endParaRPr lang="en-US" sz="800" dirty="0" smtClean="0"/>
-          </a:p>
-          <a:p>
-            <a:pPr algn="ctr"/>
-            <a:r>
-              <a:rPr lang="en-US" sz="1600" dirty="0" smtClean="0">
-                <a:latin typeface="Courier" charset="0"/>
-                <a:ea typeface="Courier" charset="0"/>
-                <a:cs typeface="Courier" charset="0"/>
-              </a:rPr>
-              <a:t>skip</a:t>
-            </a:r>
-          </a:p>
-          <a:p>
-            <a:pPr algn="ctr"/>
-            <a:r>
-              <a:rPr lang="en-US" sz="1600" dirty="0" smtClean="0">
-                <a:latin typeface="Courier" charset="0"/>
-                <a:ea typeface="Courier" charset="0"/>
-                <a:cs typeface="Courier" charset="0"/>
-              </a:rPr>
-              <a:t>x := e</a:t>
-            </a:r>
-          </a:p>
-          <a:p>
-            <a:pPr algn="ctr"/>
-            <a:r>
-              <a:rPr lang="en-US" sz="1600" dirty="0" smtClean="0">
-                <a:latin typeface="Courier" charset="0"/>
-                <a:ea typeface="Courier" charset="0"/>
-                <a:cs typeface="Courier" charset="0"/>
-              </a:rPr>
-              <a:t>x := new()</a:t>
-            </a:r>
+            <a:endParaRPr lang="en-US" sz="800" dirty="0"/>
           </a:p>
           <a:p>
             <a:pPr algn="ctr"/>
@@ -5998,26 +5972,7 @@
                 <a:ea typeface="Courier" charset="0"/>
                 <a:cs typeface="Courier" charset="0"/>
               </a:rPr>
-              <a:t>x</a:t>
-            </a:r>
-            <a:r>
-              <a:rPr lang="en-US" sz="1600" dirty="0" smtClean="0">
-                <a:latin typeface="Courier" charset="0"/>
-                <a:ea typeface="Courier" charset="0"/>
-                <a:cs typeface="Courier" charset="0"/>
-              </a:rPr>
-              <a:t> := [e, e]</a:t>
-            </a:r>
-          </a:p>
-          <a:p>
-            <a:pPr algn="ctr"/>
-            <a:r>
-              <a:rPr lang="en-US" sz="1600" dirty="0" smtClean="0">
-                <a:latin typeface="Courier" charset="0"/>
-                <a:ea typeface="Courier" charset="0"/>
-                <a:cs typeface="Courier" charset="0"/>
-              </a:rPr>
-              <a:t>[e, e] := e</a:t>
+              <a:t>skip</a:t>
             </a:r>
           </a:p>
           <a:p>
@@ -6028,48 +5983,57 @@
                 <a:ea typeface="Courier" charset="0"/>
                 <a:cs typeface="Courier" charset="0"/>
               </a:rPr>
-              <a:t>d</a:t>
-            </a:r>
-            <a:r>
-              <a:rPr lang="en-US" sz="1600" dirty="0" smtClean="0">
+              <a:t>x := e</a:t>
+            </a:r>
+          </a:p>
+          <a:p>
+            <a:pPr algn="ctr"/>
+            <a:r>
+              <a:rPr lang="en-US" sz="1600" dirty="0">
                 <a:latin typeface="Courier" charset="0"/>
                 <a:ea typeface="Courier" charset="0"/>
                 <a:cs typeface="Courier" charset="0"/>
               </a:rPr>
-              <a:t>elete (e, e)</a:t>
+              <a:t>x := new()</a:t>
             </a:r>
           </a:p>
           <a:p>
             <a:pPr algn="ctr"/>
             <a:r>
-              <a:rPr lang="en-US" sz="1600" dirty="0" smtClean="0">
+              <a:rPr lang="en-US" sz="1600" dirty="0">
                 <a:latin typeface="Courier" charset="0"/>
                 <a:ea typeface="Courier" charset="0"/>
                 <a:cs typeface="Courier" charset="0"/>
               </a:rPr>
-              <a:t>x := </a:t>
-            </a:r>
-            <a:r>
-              <a:rPr lang="en-US" sz="1600" dirty="0" err="1" smtClean="0">
+              <a:t>x := [e, e]</a:t>
+            </a:r>
+          </a:p>
+          <a:p>
+            <a:pPr algn="ctr"/>
+            <a:r>
+              <a:rPr lang="en-US" sz="1600" dirty="0">
                 <a:latin typeface="Courier" charset="0"/>
                 <a:ea typeface="Courier" charset="0"/>
                 <a:cs typeface="Courier" charset="0"/>
               </a:rPr>
-              <a:t>hasField</a:t>
-            </a:r>
-            <a:r>
-              <a:rPr lang="en-US" sz="1600" dirty="0" smtClean="0">
+              <a:t>[e, e] := e</a:t>
+            </a:r>
+          </a:p>
+          <a:p>
+            <a:pPr algn="ctr"/>
+            <a:r>
+              <a:rPr lang="en-US" sz="1600" dirty="0">
                 <a:latin typeface="Courier" charset="0"/>
                 <a:ea typeface="Courier" charset="0"/>
                 <a:cs typeface="Courier" charset="0"/>
               </a:rPr>
-              <a:t>(e, e)</a:t>
+              <a:t>delete (e, e)</a:t>
             </a:r>
           </a:p>
           <a:p>
             <a:pPr algn="ctr"/>
             <a:r>
-              <a:rPr lang="en-US" sz="1600" dirty="0" smtClean="0">
+              <a:rPr lang="en-US" sz="1600" dirty="0">
                 <a:latin typeface="Courier" charset="0"/>
                 <a:ea typeface="Courier" charset="0"/>
                 <a:cs typeface="Courier" charset="0"/>
@@ -6077,15 +6041,42 @@
               <a:t>x := </a:t>
             </a:r>
             <a:r>
-              <a:rPr lang="en-US" sz="1600" dirty="0" err="1" smtClean="0">
+              <a:rPr lang="en-US" sz="1600" dirty="0" err="1">
                 <a:latin typeface="Courier" charset="0"/>
                 <a:ea typeface="Courier" charset="0"/>
                 <a:cs typeface="Courier" charset="0"/>
               </a:rPr>
+              <a:t>hasField</a:t>
+            </a:r>
+            <a:r>
+              <a:rPr lang="en-US" sz="1600" dirty="0">
+                <a:latin typeface="Courier" charset="0"/>
+                <a:ea typeface="Courier" charset="0"/>
+                <a:cs typeface="Courier" charset="0"/>
+              </a:rPr>
+              <a:t>(e, e)</a:t>
+            </a:r>
+          </a:p>
+          <a:p>
+            <a:pPr algn="ctr"/>
+            <a:r>
+              <a:rPr lang="en-US" sz="1600" dirty="0">
+                <a:latin typeface="Courier" charset="0"/>
+                <a:ea typeface="Courier" charset="0"/>
+                <a:cs typeface="Courier" charset="0"/>
+              </a:rPr>
+              <a:t>x := </a:t>
+            </a:r>
+            <a:r>
+              <a:rPr lang="en-US" sz="1600" dirty="0" err="1">
+                <a:latin typeface="Courier" charset="0"/>
+                <a:ea typeface="Courier" charset="0"/>
+                <a:cs typeface="Courier" charset="0"/>
+              </a:rPr>
               <a:t>getFields</a:t>
             </a:r>
             <a:r>
-              <a:rPr lang="en-US" sz="1600" dirty="0" smtClean="0">
+              <a:rPr lang="en-US" sz="1600" dirty="0">
                 <a:latin typeface="Courier" charset="0"/>
                 <a:ea typeface="Courier" charset="0"/>
                 <a:cs typeface="Courier" charset="0"/>
@@ -6119,7 +6110,7 @@
           <a:p>
             <a:pPr algn="ctr"/>
             <a:r>
-              <a:rPr lang="en-US" sz="2000" b="1" dirty="0" smtClean="0">
+              <a:rPr lang="en-US" sz="2000" b="1" dirty="0">
                 <a:solidFill>
                   <a:schemeClr val="accent2"/>
                 </a:solidFill>
@@ -6127,7 +6118,7 @@
               <a:t>Expressions (</a:t>
             </a:r>
             <a:r>
-              <a:rPr lang="en-US" b="1" dirty="0" smtClean="0">
+              <a:rPr lang="en-US" b="1" dirty="0">
                 <a:solidFill>
                   <a:schemeClr val="accent2"/>
                 </a:solidFill>
@@ -6138,7 +6129,7 @@
               <a:t>e</a:t>
             </a:r>
             <a:r>
-              <a:rPr lang="en-US" sz="2000" b="1" dirty="0" smtClean="0">
+              <a:rPr lang="en-US" sz="2000" b="1" dirty="0">
                 <a:solidFill>
                   <a:schemeClr val="accent2"/>
                 </a:solidFill>
@@ -6148,190 +6139,7 @@
           </a:p>
           <a:p>
             <a:pPr algn="ctr"/>
-            <a:endParaRPr lang="en-US" sz="800" dirty="0" smtClean="0"/>
-          </a:p>
-          <a:p>
-            <a:pPr algn="ctr"/>
-            <a:r>
-              <a:rPr lang="en-US" sz="1600" dirty="0" smtClean="0">
-                <a:latin typeface="Courier" charset="0"/>
-                <a:ea typeface="Courier" charset="0"/>
-                <a:cs typeface="Courier" charset="0"/>
-              </a:rPr>
-              <a:t>v</a:t>
-            </a:r>
-          </a:p>
-          <a:p>
-            <a:pPr algn="ctr"/>
-            <a:r>
-              <a:rPr lang="en-US" sz="1600" dirty="0" smtClean="0">
-                <a:latin typeface="Courier" charset="0"/>
-                <a:ea typeface="Courier" charset="0"/>
-                <a:cs typeface="Courier" charset="0"/>
-              </a:rPr>
-              <a:t>x</a:t>
-            </a:r>
-          </a:p>
-          <a:p>
-            <a:pPr algn="ctr"/>
-            <a:r>
-              <a:rPr lang="en-US" sz="1600" dirty="0" smtClean="0">
-                <a:latin typeface="Courier" charset="0"/>
-                <a:ea typeface="Courier" charset="0"/>
-                <a:cs typeface="Courier" charset="0"/>
-              </a:rPr>
-              <a:t>-</a:t>
-            </a:r>
-            <a:r>
-              <a:rPr lang="en-US" sz="1600" dirty="0" smtClean="0">
-                <a:ea typeface="Courier" charset="0"/>
-                <a:cs typeface="Courier" charset="0"/>
-              </a:rPr>
-              <a:t> </a:t>
-            </a:r>
-            <a:r>
-              <a:rPr lang="en-US" sz="1600" dirty="0" smtClean="0">
-                <a:latin typeface="Courier" charset="0"/>
-                <a:ea typeface="Courier" charset="0"/>
-                <a:cs typeface="Courier" charset="0"/>
-              </a:rPr>
-              <a:t>e, e</a:t>
-            </a:r>
-            <a:r>
-              <a:rPr lang="en-US" sz="1600" dirty="0" smtClean="0">
-                <a:ea typeface="Courier" charset="0"/>
-                <a:cs typeface="Courier" charset="0"/>
-              </a:rPr>
-              <a:t> </a:t>
-            </a:r>
-            <a:r>
-              <a:rPr lang="en-US" sz="1600" dirty="0" smtClean="0">
-                <a:latin typeface="Courier" charset="0"/>
-                <a:ea typeface="Courier" charset="0"/>
-                <a:cs typeface="Courier" charset="0"/>
-              </a:rPr>
-              <a:t>+</a:t>
-            </a:r>
-            <a:r>
-              <a:rPr lang="en-US" sz="1600" dirty="0" smtClean="0">
-                <a:ea typeface="Courier" charset="0"/>
-                <a:cs typeface="Courier" charset="0"/>
-              </a:rPr>
-              <a:t> </a:t>
-            </a:r>
-            <a:r>
-              <a:rPr lang="en-US" sz="1600" dirty="0" smtClean="0">
-                <a:latin typeface="Courier" charset="0"/>
-                <a:ea typeface="Courier" charset="0"/>
-                <a:cs typeface="Courier" charset="0"/>
-              </a:rPr>
-              <a:t>e</a:t>
-            </a:r>
-          </a:p>
-          <a:p>
-            <a:pPr algn="ctr"/>
-            <a:r>
-              <a:rPr lang="en-US" sz="1600" dirty="0" err="1" smtClean="0">
-                <a:latin typeface="Courier" charset="0"/>
-                <a:ea typeface="Courier" charset="0"/>
-                <a:cs typeface="Courier" charset="0"/>
-              </a:rPr>
-              <a:t>typeOf</a:t>
-            </a:r>
-            <a:r>
-              <a:rPr lang="en-US" sz="1600" dirty="0" smtClean="0">
-                <a:latin typeface="Courier" charset="0"/>
-                <a:ea typeface="Courier" charset="0"/>
-                <a:cs typeface="Courier" charset="0"/>
-              </a:rPr>
-              <a:t>(e)</a:t>
-            </a:r>
-          </a:p>
-          <a:p>
-            <a:pPr algn="ctr"/>
-            <a:r>
-              <a:rPr lang="en-US" sz="1600" dirty="0" err="1" smtClean="0">
-                <a:latin typeface="Courier" charset="0"/>
-                <a:ea typeface="Courier" charset="0"/>
-                <a:cs typeface="Courier" charset="0"/>
-              </a:rPr>
-              <a:t>e.</a:t>
-            </a:r>
-            <a:r>
-              <a:rPr lang="en-US" sz="1600" baseline="-25000" dirty="0" err="1" smtClean="0">
-                <a:latin typeface="Courier" charset="0"/>
-                <a:ea typeface="Courier" charset="0"/>
-                <a:cs typeface="Courier" charset="0"/>
-              </a:rPr>
-              <a:t>v</a:t>
-            </a:r>
-            <a:r>
-              <a:rPr lang="en-US" sz="1600" dirty="0" err="1" smtClean="0">
-                <a:latin typeface="Courier" charset="0"/>
-                <a:ea typeface="Courier" charset="0"/>
-                <a:cs typeface="Courier" charset="0"/>
-              </a:rPr>
-              <a:t>e</a:t>
-            </a:r>
-            <a:r>
-              <a:rPr lang="en-US" sz="1600" dirty="0" smtClean="0">
-                <a:latin typeface="Courier" charset="0"/>
-                <a:ea typeface="Courier" charset="0"/>
-                <a:cs typeface="Courier" charset="0"/>
-              </a:rPr>
-              <a:t>, </a:t>
-            </a:r>
-            <a:r>
-              <a:rPr lang="en-US" sz="1600" dirty="0" err="1" smtClean="0">
-                <a:latin typeface="Courier" charset="0"/>
-                <a:ea typeface="Courier" charset="0"/>
-                <a:cs typeface="Courier" charset="0"/>
-              </a:rPr>
-              <a:t>e.</a:t>
-            </a:r>
-            <a:r>
-              <a:rPr lang="en-US" sz="1600" baseline="-25000" dirty="0" err="1" smtClean="0">
-                <a:latin typeface="Courier" charset="0"/>
-                <a:ea typeface="Courier" charset="0"/>
-                <a:cs typeface="Courier" charset="0"/>
-              </a:rPr>
-              <a:t>o</a:t>
-            </a:r>
-            <a:r>
-              <a:rPr lang="en-US" sz="1600" dirty="0" err="1" smtClean="0">
-                <a:latin typeface="Courier" charset="0"/>
-                <a:ea typeface="Courier" charset="0"/>
-                <a:cs typeface="Courier" charset="0"/>
-              </a:rPr>
-              <a:t>e</a:t>
-            </a:r>
-            <a:endParaRPr lang="en-US" sz="1600" dirty="0" smtClean="0">
-              <a:latin typeface="Courier" charset="0"/>
-              <a:ea typeface="Courier" charset="0"/>
-              <a:cs typeface="Courier" charset="0"/>
-            </a:endParaRPr>
-          </a:p>
-          <a:p>
-            <a:pPr algn="ctr"/>
-            <a:r>
-              <a:rPr lang="en-US" sz="1600" dirty="0" smtClean="0">
-                <a:latin typeface="Courier" charset="0"/>
-                <a:ea typeface="Courier" charset="0"/>
-                <a:cs typeface="Courier" charset="0"/>
-              </a:rPr>
-              <a:t>base(e)</a:t>
-            </a:r>
-          </a:p>
-          <a:p>
-            <a:pPr algn="ctr"/>
-            <a:r>
-              <a:rPr lang="en-US" sz="1600" dirty="0" smtClean="0">
-                <a:latin typeface="Courier" charset="0"/>
-                <a:ea typeface="Courier" charset="0"/>
-                <a:cs typeface="Courier" charset="0"/>
-              </a:rPr>
-              <a:t>field(e)</a:t>
-            </a:r>
+            <a:endParaRPr lang="en-US" sz="800" dirty="0"/>
           </a:p>
           <a:p>
             <a:pPr algn="ctr"/>
@@ -6341,21 +6149,191 @@
                 <a:ea typeface="Courier" charset="0"/>
                 <a:cs typeface="Courier" charset="0"/>
               </a:rPr>
-              <a:t>n</a:t>
-            </a:r>
-            <a:r>
-              <a:rPr lang="en-US" sz="1600" dirty="0" smtClean="0">
+              <a:t>v</a:t>
+            </a:r>
+          </a:p>
+          <a:p>
+            <a:pPr algn="ctr"/>
+            <a:r>
+              <a:rPr lang="en-US" sz="1600" dirty="0">
                 <a:latin typeface="Courier" charset="0"/>
                 <a:ea typeface="Courier" charset="0"/>
                 <a:cs typeface="Courier" charset="0"/>
               </a:rPr>
-              <a:t>th (e, e)</a:t>
+              <a:t>x</a:t>
+            </a:r>
+          </a:p>
+          <a:p>
+            <a:pPr algn="ctr"/>
+            <a:r>
+              <a:rPr lang="en-US" sz="1600" dirty="0">
+                <a:latin typeface="Courier" charset="0"/>
+                <a:ea typeface="Courier" charset="0"/>
+                <a:cs typeface="Courier" charset="0"/>
+              </a:rPr>
+              <a:t>-</a:t>
+            </a:r>
+            <a:r>
+              <a:rPr lang="en-US" sz="1600" dirty="0">
+                <a:ea typeface="Courier" charset="0"/>
+                <a:cs typeface="Courier" charset="0"/>
+              </a:rPr>
+              <a:t> </a:t>
+            </a:r>
+            <a:r>
+              <a:rPr lang="en-US" sz="1600" dirty="0">
+                <a:latin typeface="Courier" charset="0"/>
+                <a:ea typeface="Courier" charset="0"/>
+                <a:cs typeface="Courier" charset="0"/>
+              </a:rPr>
+              <a:t>e, e</a:t>
+            </a:r>
+            <a:r>
+              <a:rPr lang="en-US" sz="1600" dirty="0">
+                <a:ea typeface="Courier" charset="0"/>
+                <a:cs typeface="Courier" charset="0"/>
+              </a:rPr>
+              <a:t> </a:t>
+            </a:r>
+            <a:r>
+              <a:rPr lang="en-US" sz="1600" dirty="0">
+                <a:latin typeface="Courier" charset="0"/>
+                <a:ea typeface="Courier" charset="0"/>
+                <a:cs typeface="Courier" charset="0"/>
+              </a:rPr>
+              <a:t>+</a:t>
+            </a:r>
+            <a:r>
+              <a:rPr lang="en-US" sz="1600" dirty="0">
+                <a:ea typeface="Courier" charset="0"/>
+                <a:cs typeface="Courier" charset="0"/>
+              </a:rPr>
+              <a:t> </a:t>
+            </a:r>
+            <a:r>
+              <a:rPr lang="en-US" sz="1600" dirty="0">
+                <a:latin typeface="Courier" charset="0"/>
+                <a:ea typeface="Courier" charset="0"/>
+                <a:cs typeface="Courier" charset="0"/>
+              </a:rPr>
+              <a:t>e</a:t>
+            </a:r>
+          </a:p>
+          <a:p>
+            <a:pPr algn="ctr"/>
+            <a:r>
+              <a:rPr lang="en-US" sz="1600" dirty="0" err="1">
+                <a:latin typeface="Courier" charset="0"/>
+                <a:ea typeface="Courier" charset="0"/>
+                <a:cs typeface="Courier" charset="0"/>
+              </a:rPr>
+              <a:t>typeOf</a:t>
+            </a:r>
+            <a:r>
+              <a:rPr lang="en-US" sz="1600" dirty="0">
+                <a:latin typeface="Courier" charset="0"/>
+                <a:ea typeface="Courier" charset="0"/>
+                <a:cs typeface="Courier" charset="0"/>
+              </a:rPr>
+              <a:t>(e)</a:t>
+            </a:r>
+          </a:p>
+          <a:p>
+            <a:pPr algn="ctr"/>
+            <a:r>
+              <a:rPr lang="en-US" sz="1600" dirty="0" err="1">
+                <a:latin typeface="Courier" charset="0"/>
+                <a:ea typeface="Courier" charset="0"/>
+                <a:cs typeface="Courier" charset="0"/>
+              </a:rPr>
+              <a:t>e.</a:t>
+            </a:r>
+            <a:r>
+              <a:rPr lang="en-US" sz="1600" baseline="-25000" dirty="0" err="1">
+                <a:latin typeface="Courier" charset="0"/>
+                <a:ea typeface="Courier" charset="0"/>
+                <a:cs typeface="Courier" charset="0"/>
+              </a:rPr>
+              <a:t>v</a:t>
+            </a:r>
+            <a:r>
+              <a:rPr lang="en-US" sz="1600" dirty="0" err="1">
+                <a:latin typeface="Courier" charset="0"/>
+                <a:ea typeface="Courier" charset="0"/>
+                <a:cs typeface="Courier" charset="0"/>
+              </a:rPr>
+              <a:t>e</a:t>
+            </a:r>
+            <a:r>
+              <a:rPr lang="en-US" sz="1600" dirty="0">
+                <a:latin typeface="Courier" charset="0"/>
+                <a:ea typeface="Courier" charset="0"/>
+                <a:cs typeface="Courier" charset="0"/>
+              </a:rPr>
+              <a:t>, </a:t>
+            </a:r>
+            <a:r>
+              <a:rPr lang="en-US" sz="1600" dirty="0" err="1">
+                <a:latin typeface="Courier" charset="0"/>
+                <a:ea typeface="Courier" charset="0"/>
+                <a:cs typeface="Courier" charset="0"/>
+              </a:rPr>
+              <a:t>e.</a:t>
+            </a:r>
+            <a:r>
+              <a:rPr lang="en-US" sz="1600" baseline="-25000" dirty="0" err="1">
+                <a:latin typeface="Courier" charset="0"/>
+                <a:ea typeface="Courier" charset="0"/>
+                <a:cs typeface="Courier" charset="0"/>
+              </a:rPr>
+              <a:t>o</a:t>
+            </a:r>
+            <a:r>
+              <a:rPr lang="en-US" sz="1600" dirty="0" err="1">
+                <a:latin typeface="Courier" charset="0"/>
+                <a:ea typeface="Courier" charset="0"/>
+                <a:cs typeface="Courier" charset="0"/>
+              </a:rPr>
+              <a:t>e</a:t>
             </a:r>
             <a:endParaRPr lang="en-US" sz="1600" dirty="0">
               <a:latin typeface="Courier" charset="0"/>
               <a:ea typeface="Courier" charset="0"/>
               <a:cs typeface="Courier" charset="0"/>
             </a:endParaRPr>
+          </a:p>
+          <a:p>
+            <a:pPr algn="ctr"/>
+            <a:r>
+              <a:rPr lang="en-US" sz="1600" dirty="0">
+                <a:latin typeface="Courier" charset="0"/>
+                <a:ea typeface="Courier" charset="0"/>
+                <a:cs typeface="Courier" charset="0"/>
+              </a:rPr>
+              <a:t>base(e)</a:t>
+            </a:r>
+          </a:p>
+          <a:p>
+            <a:pPr algn="ctr"/>
+            <a:r>
+              <a:rPr lang="en-US" sz="1600" dirty="0">
+                <a:latin typeface="Courier" charset="0"/>
+                <a:ea typeface="Courier" charset="0"/>
+                <a:cs typeface="Courier" charset="0"/>
+              </a:rPr>
+              <a:t>field(e)</a:t>
+            </a:r>
+          </a:p>
+          <a:p>
+            <a:pPr algn="ctr"/>
+            <a:r>
+              <a:rPr lang="en-US" sz="1600" dirty="0">
+                <a:latin typeface="Courier" charset="0"/>
+                <a:ea typeface="Courier" charset="0"/>
+                <a:cs typeface="Courier" charset="0"/>
+              </a:rPr>
+              <a:t>nth (e, e)</a:t>
+            </a:r>
           </a:p>
         </p:txBody>
       </p:sp>
@@ -6397,7 +6375,7 @@
             <a:p>
               <a:pPr algn="ctr"/>
               <a:r>
-                <a:rPr lang="en-US" sz="2000" b="1" dirty="0" smtClean="0">
+                <a:rPr lang="en-US" sz="2000" b="1" dirty="0">
                   <a:solidFill>
                     <a:schemeClr val="accent2"/>
                   </a:solidFill>
@@ -6405,7 +6383,7 @@
                 <a:t>Commands (</a:t>
               </a:r>
               <a:r>
-                <a:rPr lang="en-US" b="1" dirty="0" smtClean="0">
+                <a:rPr lang="en-US" b="1" dirty="0">
                   <a:solidFill>
                     <a:schemeClr val="accent2"/>
                   </a:solidFill>
@@ -6416,7 +6394,7 @@
                 <a:t>c</a:t>
               </a:r>
               <a:r>
-                <a:rPr lang="en-US" sz="2000" b="1" dirty="0" smtClean="0">
+                <a:rPr lang="en-US" sz="2000" b="1" dirty="0">
                   <a:solidFill>
                     <a:schemeClr val="accent2"/>
                   </a:solidFill>
@@ -6435,14 +6413,14 @@
             <a:p>
               <a:pPr algn="ctr"/>
               <a:r>
-                <a:rPr lang="en-US" sz="1600" dirty="0" err="1" smtClean="0">
+                <a:rPr lang="en-US" sz="1600" dirty="0" err="1">
                   <a:latin typeface="Courier" charset="0"/>
                   <a:ea typeface="Courier" charset="0"/>
                   <a:cs typeface="Courier" charset="0"/>
                 </a:rPr>
                 <a:t>bc</a:t>
               </a:r>
-              <a:endParaRPr lang="en-US" sz="1600" dirty="0" smtClean="0">
+              <a:endParaRPr lang="en-US" sz="1600" dirty="0">
                 <a:latin typeface="Courier" charset="0"/>
                 <a:ea typeface="Courier" charset="0"/>
                 <a:cs typeface="Courier" charset="0"/>
@@ -6451,7 +6429,7 @@
             <a:p>
               <a:pPr algn="ctr"/>
               <a:r>
-                <a:rPr lang="en-US" sz="1600" dirty="0" err="1" smtClean="0">
+                <a:rPr lang="en-US" sz="1600" dirty="0" err="1">
                   <a:latin typeface="Courier" charset="0"/>
                   <a:ea typeface="Courier" charset="0"/>
                   <a:cs typeface="Courier" charset="0"/>
@@ -6459,7 +6437,7 @@
                 <a:t>goto</a:t>
               </a:r>
               <a:r>
-                <a:rPr lang="en-US" sz="1600" dirty="0" smtClean="0">
+                <a:rPr lang="en-US" sz="1600" dirty="0">
                   <a:latin typeface="Courier" charset="0"/>
                   <a:ea typeface="Courier" charset="0"/>
                   <a:cs typeface="Courier" charset="0"/>
@@ -6467,14 +6445,14 @@
                 <a:t> </a:t>
               </a:r>
               <a:r>
-                <a:rPr lang="en-US" sz="1600" dirty="0" err="1" smtClean="0">
+                <a:rPr lang="en-US" sz="1600" dirty="0" err="1">
                   <a:latin typeface="Courier" charset="0"/>
                   <a:ea typeface="Courier" charset="0"/>
                   <a:cs typeface="Courier" charset="0"/>
                 </a:rPr>
                 <a:t>i</a:t>
               </a:r>
-              <a:endParaRPr lang="en-US" sz="1600" dirty="0" smtClean="0">
+              <a:endParaRPr lang="en-US" sz="1600" dirty="0">
                 <a:latin typeface="Courier" charset="0"/>
                 <a:ea typeface="Courier" charset="0"/>
                 <a:cs typeface="Courier" charset="0"/>
@@ -6483,7 +6461,7 @@
             <a:p>
               <a:pPr algn="ctr"/>
               <a:r>
-                <a:rPr lang="en-US" sz="1600" dirty="0" err="1" smtClean="0">
+                <a:rPr lang="en-US" sz="1600" dirty="0" err="1">
                   <a:latin typeface="Courier" charset="0"/>
                   <a:ea typeface="Courier" charset="0"/>
                   <a:cs typeface="Courier" charset="0"/>
@@ -6491,7 +6469,7 @@
                 <a:t>goto</a:t>
               </a:r>
               <a:r>
-                <a:rPr lang="en-US" sz="1600" dirty="0" smtClean="0">
+                <a:rPr lang="en-US" sz="1600" dirty="0">
                   <a:latin typeface="Courier" charset="0"/>
                   <a:ea typeface="Courier" charset="0"/>
                   <a:cs typeface="Courier" charset="0"/>
@@ -6499,7 +6477,7 @@
                 <a:t> [e] </a:t>
               </a:r>
               <a:r>
-                <a:rPr lang="en-US" sz="1600" dirty="0" err="1" smtClean="0">
+                <a:rPr lang="en-US" sz="1600" dirty="0" err="1">
                   <a:latin typeface="Courier" charset="0"/>
                   <a:ea typeface="Courier" charset="0"/>
                   <a:cs typeface="Courier" charset="0"/>
@@ -6507,7 +6485,7 @@
                 <a:t>i</a:t>
               </a:r>
               <a:r>
-                <a:rPr lang="en-US" sz="1600" dirty="0" smtClean="0">
+                <a:rPr lang="en-US" sz="1600" dirty="0">
                   <a:latin typeface="Courier" charset="0"/>
                   <a:ea typeface="Courier" charset="0"/>
                   <a:cs typeface="Courier" charset="0"/>
@@ -6518,7 +6496,7 @@
             <a:p>
               <a:pPr algn="ctr"/>
               <a:r>
-                <a:rPr lang="en-US" sz="1600" dirty="0" smtClean="0">
+                <a:rPr lang="en-US" sz="1600" dirty="0">
                   <a:latin typeface="Courier" charset="0"/>
                   <a:ea typeface="Courier" charset="0"/>
                   <a:cs typeface="Courier" charset="0"/>
@@ -6526,7 +6504,7 @@
                 <a:t>x := e (e, </a:t>
               </a:r>
               <a:r>
-                <a:rPr lang="is-IS" sz="1600" dirty="0" smtClean="0">
+                <a:rPr lang="is-IS" sz="1600" dirty="0">
                   <a:latin typeface="Courier" charset="0"/>
                   <a:ea typeface="Courier" charset="0"/>
                   <a:cs typeface="Courier" charset="0"/>
@@ -6537,7 +6515,7 @@
             <a:p>
               <a:pPr algn="ctr"/>
               <a:r>
-                <a:rPr lang="en-US" sz="1600" dirty="0" smtClean="0">
+                <a:rPr lang="en-US" sz="1600" dirty="0">
                   <a:latin typeface="Courier" charset="0"/>
                   <a:ea typeface="Courier" charset="0"/>
                   <a:cs typeface="Courier" charset="0"/>
@@ -6545,14 +6523,14 @@
                 <a:t>x = PHI (x, </a:t>
               </a:r>
               <a:r>
-                <a:rPr lang="is-IS" sz="1600" dirty="0" smtClean="0">
+                <a:rPr lang="is-IS" sz="1600" dirty="0">
                   <a:latin typeface="Courier" charset="0"/>
                   <a:ea typeface="Courier" charset="0"/>
                   <a:cs typeface="Courier" charset="0"/>
                 </a:rPr>
                 <a:t>…, x)</a:t>
               </a:r>
-              <a:endParaRPr lang="en-US" sz="1600" dirty="0" smtClean="0">
+              <a:endParaRPr lang="en-US" sz="1600" dirty="0">
                 <a:latin typeface="Courier" charset="0"/>
                 <a:ea typeface="Courier" charset="0"/>
                 <a:cs typeface="Courier" charset="0"/>
@@ -6584,7 +6562,7 @@
             <a:p>
               <a:pPr algn="ctr"/>
               <a:r>
-                <a:rPr lang="en-US" sz="2000" b="1" dirty="0" smtClean="0">
+                <a:rPr lang="en-US" sz="2000" b="1" dirty="0">
                   <a:solidFill>
                     <a:schemeClr val="accent2"/>
                   </a:solidFill>
@@ -6592,7 +6570,7 @@
                 <a:t>Procedures (</a:t>
               </a:r>
               <a:r>
-                <a:rPr lang="en-US" b="1" dirty="0" smtClean="0">
+                <a:rPr lang="en-US" b="1" dirty="0">
                   <a:solidFill>
                     <a:schemeClr val="accent2"/>
                   </a:solidFill>
@@ -6603,7 +6581,7 @@
                 <a:t>proc</a:t>
               </a:r>
               <a:r>
-                <a:rPr lang="en-US" sz="2000" b="1" dirty="0" smtClean="0">
+                <a:rPr lang="en-US" sz="2000" b="1" dirty="0">
                   <a:solidFill>
                     <a:schemeClr val="accent2"/>
                   </a:solidFill>
@@ -6627,23 +6605,7 @@
                   <a:ea typeface="Courier" charset="0"/>
                   <a:cs typeface="Courier" charset="0"/>
                 </a:rPr>
-                <a:t>p</a:t>
-              </a:r>
-              <a:r>
-                <a:rPr lang="en-US" sz="1600" dirty="0" smtClean="0">
-                  <a:latin typeface="Courier" charset="0"/>
-                  <a:ea typeface="Courier" charset="0"/>
-                  <a:cs typeface="Courier" charset="0"/>
-                </a:rPr>
-                <a:t>roc m(x, </a:t>
-              </a:r>
-              <a:r>
-                <a:rPr lang="is-IS" sz="1600" dirty="0" smtClean="0">
-                  <a:latin typeface="Courier" charset="0"/>
-                  <a:ea typeface="Courier" charset="0"/>
-                  <a:cs typeface="Courier" charset="0"/>
-                </a:rPr>
-                <a:t>…, x) {c, </a:t>
+                <a:t>proc m(x, </a:t>
               </a:r>
               <a:r>
                 <a:rPr lang="is-IS" sz="1600" dirty="0">
@@ -6651,17 +6613,9 @@
                   <a:ea typeface="Courier" charset="0"/>
                   <a:cs typeface="Courier" charset="0"/>
                 </a:rPr>
-                <a:t>…</a:t>
+                <a:t>…, x) {c, …, c}</a:t>
               </a:r>
-              <a:r>
-                <a:rPr lang="is-IS" sz="1600" dirty="0" smtClean="0">
-                  <a:latin typeface="Courier" charset="0"/>
-                  <a:ea typeface="Courier" charset="0"/>
-                  <a:cs typeface="Courier" charset="0"/>
-                </a:rPr>
-                <a:t>, c}</a:t>
-              </a:r>
-              <a:endParaRPr lang="en-US" sz="1600" dirty="0" smtClean="0">
+              <a:endParaRPr lang="en-US" sz="1600" dirty="0">
                 <a:latin typeface="Courier" charset="0"/>
                 <a:ea typeface="Courier" charset="0"/>
                 <a:cs typeface="Courier" charset="0"/>
@@ -7239,21 +7193,17 @@
             </a:pPr>
             <a:r>
               <a:rPr lang="en-US" dirty="0"/>
-              <a:t>V</a:t>
-            </a:r>
-            <a:r>
-              <a:rPr lang="en-US" dirty="0" smtClean="0"/>
-              <a:t>erification tools, esp. separation logic ones, compile to </a:t>
-            </a:r>
-            <a:r>
-              <a:rPr lang="en-US" dirty="0" err="1" smtClean="0"/>
+              <a:t>Verification tools, esp. separation logic ones, compile to </a:t>
+            </a:r>
+            <a:r>
+              <a:rPr lang="en-US" dirty="0" err="1"/>
               <a:t>goto</a:t>
             </a:r>
             <a:r>
-              <a:rPr lang="en-US" dirty="0" smtClean="0"/>
+              <a:rPr lang="en-US" dirty="0"/>
               <a:t> languages</a:t>
             </a:r>
-            <a:endParaRPr lang="en-US" sz="800" dirty="0" smtClean="0"/>
+            <a:endParaRPr lang="en-US" sz="800" dirty="0"/>
           </a:p>
           <a:p>
             <a:pPr>
@@ -7308,13 +7258,8 @@
             </a:r>
             <a:r>
               <a:rPr lang="en-US" dirty="0"/>
-              <a:t> </a:t>
-            </a:r>
-            <a:r>
-              <a:rPr lang="en-US" dirty="0" smtClean="0"/>
-              <a:t>language</a:t>
-            </a:r>
-            <a:endParaRPr lang="en-US" dirty="0"/>
+              <a:t> language</a:t>
+            </a:r>
           </a:p>
         </p:txBody>
       </p:sp>
@@ -8348,10 +8293,18 @@
           <a:lstStyle/>
           <a:p>
             <a:r>
-              <a:rPr lang="en-US" dirty="0" err="1" smtClean="0"/>
+              <a:rPr lang="en-US" b="1" u="sng" dirty="0" err="1">
+                <a:solidFill>
+                  <a:schemeClr val="accent2"/>
+                </a:solidFill>
+              </a:rPr>
               <a:t>Object.prototype.isPrototypeOf</a:t>
             </a:r>
-            <a:endParaRPr lang="en-US" dirty="0"/>
+            <a:endParaRPr lang="en-US" b="1" u="sng" dirty="0">
+              <a:solidFill>
+                <a:schemeClr val="accent2"/>
+              </a:solidFill>
+            </a:endParaRPr>
           </a:p>
         </p:txBody>
       </p:sp>
@@ -8362,44 +8315,1223 @@
             <a:spLocks noGrp="1"/>
           </p:cNvSpPr>
           <p:nvPr>
-            <p:ph idx="1"/>
+            <p:ph sz="half" idx="1"/>
           </p:nvPr>
         </p:nvSpPr>
-        <p:spPr/>
+        <p:spPr>
+          <a:xfrm>
+            <a:off x="619486" y="2167017"/>
+            <a:ext cx="4937760" cy="4023359"/>
+          </a:xfrm>
+        </p:spPr>
         <p:txBody>
           <a:bodyPr/>
           <a:lstStyle/>
           <a:p>
+            <a:pPr marL="457200" indent="-457200">
+              <a:buFont typeface="+mj-lt"/>
+              <a:buAutoNum type="arabicPeriod"/>
+            </a:pPr>
             <a:r>
               <a:rPr lang="en-US" dirty="0"/>
-              <a:t>Example (</a:t>
+              <a:t>If V is not an object, return </a:t>
+            </a:r>
+            <a:r>
+              <a:rPr lang="en-US" b="1" dirty="0"/>
+              <a:t>false</a:t>
+            </a:r>
+            <a:r>
+              <a:rPr lang="en-US" dirty="0"/>
+              <a:t>.</a:t>
+            </a:r>
+          </a:p>
+          <a:p>
+            <a:pPr marL="457200" indent="-457200">
+              <a:buFont typeface="+mj-lt"/>
+              <a:buAutoNum type="arabicPeriod"/>
+            </a:pPr>
+            <a:r>
+              <a:rPr lang="en-US" dirty="0"/>
+              <a:t>Let O be the result of calling </a:t>
             </a:r>
             <a:r>
               <a:rPr lang="en-US" dirty="0" err="1"/>
-              <a:t>isPrototypeOf</a:t>
+              <a:t>ToObject</a:t>
             </a:r>
             <a:r>
               <a:rPr lang="en-US" dirty="0"/>
-              <a:t>): standard, PBS, </a:t>
-            </a:r>
-            <a:r>
-              <a:rPr lang="en-US" dirty="0" smtClean="0"/>
-              <a:t>JSIL</a:t>
-            </a:r>
-          </a:p>
-          <a:p>
-            <a:r>
-              <a:rPr lang="en-US" dirty="0" smtClean="0"/>
-              <a:t>Use examples</a:t>
-            </a:r>
-            <a:endParaRPr lang="en-US" dirty="0"/>
+              <a:t> passing the </a:t>
+            </a:r>
+            <a:r>
+              <a:rPr lang="en-US" b="1" dirty="0"/>
+              <a:t>this </a:t>
+            </a:r>
+            <a:r>
+              <a:rPr lang="en-US" dirty="0"/>
+              <a:t>value as the argument.</a:t>
+            </a:r>
+          </a:p>
+          <a:p>
+            <a:pPr marL="457200" indent="-457200">
+              <a:buFont typeface="+mj-lt"/>
+              <a:buAutoNum type="arabicPeriod"/>
+            </a:pPr>
+            <a:r>
+              <a:rPr lang="en-US" dirty="0"/>
+              <a:t>Repeat</a:t>
+            </a:r>
+          </a:p>
+          <a:p>
+            <a:pPr marL="749793" lvl="1" indent="-457200">
+              <a:buFont typeface="+mj-lt"/>
+              <a:buAutoNum type="arabicPeriod"/>
+            </a:pPr>
+            <a:r>
+              <a:rPr lang="en-US" dirty="0"/>
+              <a:t>Let V be the value of the [[Prototype]] internal property of V .</a:t>
+            </a:r>
+          </a:p>
+          <a:p>
+            <a:pPr marL="749793" lvl="1" indent="-457200">
+              <a:buFont typeface="+mj-lt"/>
+              <a:buAutoNum type="arabicPeriod"/>
+            </a:pPr>
+            <a:r>
+              <a:rPr lang="en-US" dirty="0"/>
+              <a:t>if V is </a:t>
+            </a:r>
+            <a:r>
+              <a:rPr lang="en-US" b="1" dirty="0"/>
+              <a:t>null</a:t>
+            </a:r>
+            <a:r>
+              <a:rPr lang="en-US" dirty="0"/>
+              <a:t>, return </a:t>
+            </a:r>
+            <a:r>
+              <a:rPr lang="en-US" b="1" dirty="0"/>
+              <a:t>false</a:t>
+            </a:r>
+          </a:p>
+          <a:p>
+            <a:pPr marL="749793" lvl="1" indent="-457200">
+              <a:buFont typeface="+mj-lt"/>
+              <a:buAutoNum type="arabicPeriod"/>
+            </a:pPr>
+            <a:r>
+              <a:rPr lang="en-US" dirty="0"/>
+              <a:t>If O and V refer to the same object, return </a:t>
+            </a:r>
+            <a:r>
+              <a:rPr lang="en-US" b="1" dirty="0"/>
+              <a:t>true</a:t>
+            </a:r>
+            <a:r>
+              <a:rPr lang="en-US" dirty="0"/>
+              <a:t>.</a:t>
+            </a:r>
+          </a:p>
+        </p:txBody>
+      </p:sp>
+      <p:pic>
+        <p:nvPicPr>
+          <p:cNvPr id="5" name="Content Placeholder 4"/>
+          <p:cNvPicPr>
+            <a:picLocks noGrp="1" noChangeAspect="1"/>
+          </p:cNvPicPr>
+          <p:nvPr>
+            <p:ph sz="half" idx="2"/>
+          </p:nvPr>
+        </p:nvPicPr>
+        <p:blipFill>
+          <a:blip r:embed="rId2">
+            <a:extLst>
+              <a:ext uri="{28A0092B-C50C-407E-A947-70E740481C1C}">
+                <a14:useLocalDpi xmlns:a14="http://schemas.microsoft.com/office/drawing/2010/main" val="0"/>
+              </a:ext>
+            </a:extLst>
+          </a:blip>
+          <a:stretch>
+            <a:fillRect/>
+          </a:stretch>
+        </p:blipFill>
+        <p:spPr>
+          <a:xfrm>
+            <a:off x="5557246" y="2167017"/>
+            <a:ext cx="6003659" cy="2892063"/>
+          </a:xfrm>
+        </p:spPr>
+      </p:pic>
+      <p:sp>
+        <p:nvSpPr>
+          <p:cNvPr id="6" name="Content Placeholder 3"/>
+          <p:cNvSpPr txBox="1">
+            <a:spLocks/>
+          </p:cNvSpPr>
+          <p:nvPr/>
+        </p:nvSpPr>
+        <p:spPr>
+          <a:xfrm>
+            <a:off x="6763265" y="1766304"/>
+            <a:ext cx="5038262" cy="4390301"/>
+          </a:xfrm>
+          <a:prstGeom prst="rect">
+            <a:avLst/>
+          </a:prstGeom>
+        </p:spPr>
+        <p:txBody>
+          <a:bodyPr vert="horz" lIns="0" tIns="45720" rIns="0" bIns="45720" rtlCol="0">
+            <a:noAutofit/>
+          </a:bodyPr>
+          <a:lstStyle>
+            <a:lvl1pPr marL="91436" indent="-91436" algn="l" defTabSz="914354" rtl="0" eaLnBrk="1" latinLnBrk="0" hangingPunct="1">
+              <a:lnSpc>
+                <a:spcPct val="90000"/>
+              </a:lnSpc>
+              <a:spcBef>
+                <a:spcPts val="1200"/>
+              </a:spcBef>
+              <a:spcAft>
+                <a:spcPts val="200"/>
+              </a:spcAft>
+              <a:buClr>
+                <a:schemeClr val="accent1"/>
+              </a:buClr>
+              <a:buSzPct val="100000"/>
+              <a:buFont typeface="Calibri" panose="020F0502020204030204" pitchFamily="34" charset="0"/>
+              <a:buChar char=" "/>
+              <a:defRPr sz="2000" kern="1200">
+                <a:solidFill>
+                  <a:schemeClr val="tx1">
+                    <a:lumMod val="75000"/>
+                    <a:lumOff val="25000"/>
+                  </a:schemeClr>
+                </a:solidFill>
+                <a:latin typeface="+mn-lt"/>
+                <a:ea typeface="+mn-ea"/>
+                <a:cs typeface="+mn-cs"/>
+              </a:defRPr>
+            </a:lvl1pPr>
+            <a:lvl2pPr marL="384029" indent="-182870" algn="l" defTabSz="914354" rtl="0" eaLnBrk="1" latinLnBrk="0" hangingPunct="1">
+              <a:lnSpc>
+                <a:spcPct val="90000"/>
+              </a:lnSpc>
+              <a:spcBef>
+                <a:spcPts val="200"/>
+              </a:spcBef>
+              <a:spcAft>
+                <a:spcPts val="400"/>
+              </a:spcAft>
+              <a:buClr>
+                <a:schemeClr val="accent1"/>
+              </a:buClr>
+              <a:buFont typeface="Calibri" pitchFamily="34" charset="0"/>
+              <a:buChar char="◦"/>
+              <a:defRPr sz="1800" kern="1200">
+                <a:solidFill>
+                  <a:schemeClr val="tx1">
+                    <a:lumMod val="75000"/>
+                    <a:lumOff val="25000"/>
+                  </a:schemeClr>
+                </a:solidFill>
+                <a:latin typeface="+mn-lt"/>
+                <a:ea typeface="+mn-ea"/>
+                <a:cs typeface="+mn-cs"/>
+              </a:defRPr>
+            </a:lvl2pPr>
+            <a:lvl3pPr marL="566900" indent="-182870" algn="l" defTabSz="914354" rtl="0" eaLnBrk="1" latinLnBrk="0" hangingPunct="1">
+              <a:lnSpc>
+                <a:spcPct val="90000"/>
+              </a:lnSpc>
+              <a:spcBef>
+                <a:spcPts val="200"/>
+              </a:spcBef>
+              <a:spcAft>
+                <a:spcPts val="400"/>
+              </a:spcAft>
+              <a:buClr>
+                <a:schemeClr val="accent1"/>
+              </a:buClr>
+              <a:buFont typeface="Calibri" pitchFamily="34" charset="0"/>
+              <a:buChar char="◦"/>
+              <a:defRPr sz="1400" kern="1200">
+                <a:solidFill>
+                  <a:schemeClr val="tx1">
+                    <a:lumMod val="75000"/>
+                    <a:lumOff val="25000"/>
+                  </a:schemeClr>
+                </a:solidFill>
+                <a:latin typeface="+mn-lt"/>
+                <a:ea typeface="+mn-ea"/>
+                <a:cs typeface="+mn-cs"/>
+              </a:defRPr>
+            </a:lvl3pPr>
+            <a:lvl4pPr marL="749771" indent="-182870" algn="l" defTabSz="914354" rtl="0" eaLnBrk="1" latinLnBrk="0" hangingPunct="1">
+              <a:lnSpc>
+                <a:spcPct val="90000"/>
+              </a:lnSpc>
+              <a:spcBef>
+                <a:spcPts val="200"/>
+              </a:spcBef>
+              <a:spcAft>
+                <a:spcPts val="400"/>
+              </a:spcAft>
+              <a:buClr>
+                <a:schemeClr val="accent1"/>
+              </a:buClr>
+              <a:buFont typeface="Calibri" pitchFamily="34" charset="0"/>
+              <a:buChar char="◦"/>
+              <a:defRPr sz="1400" kern="1200">
+                <a:solidFill>
+                  <a:schemeClr val="tx1">
+                    <a:lumMod val="75000"/>
+                    <a:lumOff val="25000"/>
+                  </a:schemeClr>
+                </a:solidFill>
+                <a:latin typeface="+mn-lt"/>
+                <a:ea typeface="+mn-ea"/>
+                <a:cs typeface="+mn-cs"/>
+              </a:defRPr>
+            </a:lvl4pPr>
+            <a:lvl5pPr marL="932642" indent="-182870" algn="l" defTabSz="914354" rtl="0" eaLnBrk="1" latinLnBrk="0" hangingPunct="1">
+              <a:lnSpc>
+                <a:spcPct val="90000"/>
+              </a:lnSpc>
+              <a:spcBef>
+                <a:spcPts val="200"/>
+              </a:spcBef>
+              <a:spcAft>
+                <a:spcPts val="400"/>
+              </a:spcAft>
+              <a:buClr>
+                <a:schemeClr val="accent1"/>
+              </a:buClr>
+              <a:buFont typeface="Calibri" pitchFamily="34" charset="0"/>
+              <a:buChar char="◦"/>
+              <a:defRPr sz="1400" kern="1200">
+                <a:solidFill>
+                  <a:schemeClr val="tx1">
+                    <a:lumMod val="75000"/>
+                    <a:lumOff val="25000"/>
+                  </a:schemeClr>
+                </a:solidFill>
+                <a:latin typeface="+mn-lt"/>
+                <a:ea typeface="+mn-ea"/>
+                <a:cs typeface="+mn-cs"/>
+              </a:defRPr>
+            </a:lvl5pPr>
+            <a:lvl6pPr marL="1099946" indent="-228589" algn="l" defTabSz="914354" rtl="0" eaLnBrk="1" latinLnBrk="0" hangingPunct="1">
+              <a:lnSpc>
+                <a:spcPct val="90000"/>
+              </a:lnSpc>
+              <a:spcBef>
+                <a:spcPts val="200"/>
+              </a:spcBef>
+              <a:spcAft>
+                <a:spcPts val="400"/>
+              </a:spcAft>
+              <a:buClr>
+                <a:schemeClr val="accent1"/>
+              </a:buClr>
+              <a:buFont typeface="Calibri" pitchFamily="34" charset="0"/>
+              <a:buChar char="◦"/>
+              <a:defRPr sz="1400" kern="1200">
+                <a:solidFill>
+                  <a:schemeClr val="tx1">
+                    <a:lumMod val="75000"/>
+                    <a:lumOff val="25000"/>
+                  </a:schemeClr>
+                </a:solidFill>
+                <a:latin typeface="+mn-lt"/>
+                <a:ea typeface="+mn-ea"/>
+                <a:cs typeface="+mn-cs"/>
+              </a:defRPr>
+            </a:lvl6pPr>
+            <a:lvl7pPr marL="1299936" indent="-228589" algn="l" defTabSz="914354" rtl="0" eaLnBrk="1" latinLnBrk="0" hangingPunct="1">
+              <a:lnSpc>
+                <a:spcPct val="90000"/>
+              </a:lnSpc>
+              <a:spcBef>
+                <a:spcPts val="200"/>
+              </a:spcBef>
+              <a:spcAft>
+                <a:spcPts val="400"/>
+              </a:spcAft>
+              <a:buClr>
+                <a:schemeClr val="accent1"/>
+              </a:buClr>
+              <a:buFont typeface="Calibri" pitchFamily="34" charset="0"/>
+              <a:buChar char="◦"/>
+              <a:defRPr sz="1400" kern="1200">
+                <a:solidFill>
+                  <a:schemeClr val="tx1">
+                    <a:lumMod val="75000"/>
+                    <a:lumOff val="25000"/>
+                  </a:schemeClr>
+                </a:solidFill>
+                <a:latin typeface="+mn-lt"/>
+                <a:ea typeface="+mn-ea"/>
+                <a:cs typeface="+mn-cs"/>
+              </a:defRPr>
+            </a:lvl7pPr>
+            <a:lvl8pPr marL="1499925" indent="-228589" algn="l" defTabSz="914354" rtl="0" eaLnBrk="1" latinLnBrk="0" hangingPunct="1">
+              <a:lnSpc>
+                <a:spcPct val="90000"/>
+              </a:lnSpc>
+              <a:spcBef>
+                <a:spcPts val="200"/>
+              </a:spcBef>
+              <a:spcAft>
+                <a:spcPts val="400"/>
+              </a:spcAft>
+              <a:buClr>
+                <a:schemeClr val="accent1"/>
+              </a:buClr>
+              <a:buFont typeface="Calibri" pitchFamily="34" charset="0"/>
+              <a:buChar char="◦"/>
+              <a:defRPr sz="1400" kern="1200">
+                <a:solidFill>
+                  <a:schemeClr val="tx1">
+                    <a:lumMod val="75000"/>
+                    <a:lumOff val="25000"/>
+                  </a:schemeClr>
+                </a:solidFill>
+                <a:latin typeface="+mn-lt"/>
+                <a:ea typeface="+mn-ea"/>
+                <a:cs typeface="+mn-cs"/>
+              </a:defRPr>
+            </a:lvl8pPr>
+            <a:lvl9pPr marL="1699916" indent="-228589" algn="l" defTabSz="914354" rtl="0" eaLnBrk="1" latinLnBrk="0" hangingPunct="1">
+              <a:lnSpc>
+                <a:spcPct val="90000"/>
+              </a:lnSpc>
+              <a:spcBef>
+                <a:spcPts val="200"/>
+              </a:spcBef>
+              <a:spcAft>
+                <a:spcPts val="400"/>
+              </a:spcAft>
+              <a:buClr>
+                <a:schemeClr val="accent1"/>
+              </a:buClr>
+              <a:buFont typeface="Calibri" pitchFamily="34" charset="0"/>
+              <a:buChar char="◦"/>
+              <a:defRPr sz="1400" kern="1200">
+                <a:solidFill>
+                  <a:schemeClr val="tx1">
+                    <a:lumMod val="75000"/>
+                    <a:lumOff val="25000"/>
+                  </a:schemeClr>
+                </a:solidFill>
+                <a:latin typeface="+mn-lt"/>
+                <a:ea typeface="+mn-ea"/>
+                <a:cs typeface="+mn-cs"/>
+              </a:defRPr>
+            </a:lvl9pPr>
+          </a:lstStyle>
+          <a:p>
+            <a:pPr>
+              <a:lnSpc>
+                <a:spcPct val="120000"/>
+              </a:lnSpc>
+              <a:spcBef>
+                <a:spcPts val="0"/>
+              </a:spcBef>
+              <a:spcAft>
+                <a:spcPts val="0"/>
+              </a:spcAft>
+            </a:pPr>
+            <a:r>
+              <a:rPr lang="en-US" sz="1000" b="1" dirty="0">
+                <a:latin typeface="Courier"/>
+              </a:rPr>
+              <a:t>proc </a:t>
+            </a:r>
+            <a:r>
+              <a:rPr lang="en-US" sz="1000" b="1" dirty="0" err="1">
+                <a:latin typeface="Courier"/>
+              </a:rPr>
+              <a:t>OP_isPrototypeOf</a:t>
+            </a:r>
+            <a:r>
+              <a:rPr lang="en-US" sz="1000" b="1" dirty="0">
+                <a:latin typeface="Courier"/>
+              </a:rPr>
+              <a:t>(</a:t>
+            </a:r>
+            <a:r>
+              <a:rPr lang="en-US" sz="1000" b="1" dirty="0" err="1">
+                <a:latin typeface="Courier"/>
+              </a:rPr>
+              <a:t>xsc</a:t>
+            </a:r>
+            <a:r>
+              <a:rPr lang="en-US" sz="1000" b="1" dirty="0">
+                <a:latin typeface="Courier"/>
+              </a:rPr>
+              <a:t>, </a:t>
+            </a:r>
+            <a:r>
+              <a:rPr lang="en-US" sz="1000" b="1" dirty="0" err="1">
+                <a:latin typeface="Courier"/>
+              </a:rPr>
+              <a:t>vthis</a:t>
+            </a:r>
+            <a:r>
+              <a:rPr lang="en-US" sz="1000" b="1" dirty="0">
+                <a:latin typeface="Courier"/>
+              </a:rPr>
+              <a:t>, v) {</a:t>
+            </a:r>
+          </a:p>
+          <a:p>
+            <a:pPr>
+              <a:lnSpc>
+                <a:spcPct val="120000"/>
+              </a:lnSpc>
+              <a:spcBef>
+                <a:spcPts val="0"/>
+              </a:spcBef>
+              <a:spcAft>
+                <a:spcPts val="0"/>
+              </a:spcAft>
+            </a:pPr>
+            <a:r>
+              <a:rPr lang="en-US" sz="1000" b="1" dirty="0">
+                <a:latin typeface="Courier"/>
+              </a:rPr>
+              <a:t>           </a:t>
+            </a:r>
+            <a:r>
+              <a:rPr lang="en-US" sz="1000" b="1" dirty="0" err="1">
+                <a:latin typeface="Courier"/>
+              </a:rPr>
+              <a:t>goto</a:t>
+            </a:r>
+            <a:r>
+              <a:rPr lang="en-US" sz="1000" b="1" dirty="0">
+                <a:latin typeface="Courier"/>
+              </a:rPr>
+              <a:t> [</a:t>
+            </a:r>
+            <a:r>
+              <a:rPr lang="en-US" sz="1000" b="1" dirty="0" err="1">
+                <a:latin typeface="Courier"/>
+              </a:rPr>
+              <a:t>typeOf</a:t>
+            </a:r>
+            <a:r>
+              <a:rPr lang="en-US" sz="1000" b="1" dirty="0">
+                <a:latin typeface="Courier"/>
+              </a:rPr>
+              <a:t>(v) = $$</a:t>
+            </a:r>
+            <a:r>
+              <a:rPr lang="en-US" sz="1000" b="1" dirty="0" err="1">
+                <a:latin typeface="Courier"/>
+              </a:rPr>
+              <a:t>object_type</a:t>
+            </a:r>
+            <a:r>
+              <a:rPr lang="en-US" sz="1000" b="1" dirty="0">
+                <a:latin typeface="Courier"/>
+              </a:rPr>
+              <a:t>] </a:t>
+            </a:r>
+            <a:r>
+              <a:rPr lang="en-US" sz="1000" b="1" dirty="0" err="1">
+                <a:latin typeface="Courier"/>
+              </a:rPr>
+              <a:t>obj</a:t>
+            </a:r>
+            <a:r>
+              <a:rPr lang="en-US" sz="1000" b="1" dirty="0">
+                <a:latin typeface="Courier"/>
+              </a:rPr>
+              <a:t> fret;</a:t>
+            </a:r>
+          </a:p>
+          <a:p>
+            <a:pPr>
+              <a:lnSpc>
+                <a:spcPct val="120000"/>
+              </a:lnSpc>
+              <a:spcBef>
+                <a:spcPts val="0"/>
+              </a:spcBef>
+              <a:spcAft>
+                <a:spcPts val="0"/>
+              </a:spcAft>
+            </a:pPr>
+            <a:r>
+              <a:rPr lang="en-US" sz="1000" b="1" dirty="0">
+                <a:latin typeface="Courier"/>
+              </a:rPr>
+              <a:t>			</a:t>
+            </a:r>
+          </a:p>
+          <a:p>
+            <a:pPr>
+              <a:lnSpc>
+                <a:spcPct val="120000"/>
+              </a:lnSpc>
+              <a:spcBef>
+                <a:spcPts val="0"/>
+              </a:spcBef>
+              <a:spcAft>
+                <a:spcPts val="0"/>
+              </a:spcAft>
+            </a:pPr>
+            <a:r>
+              <a:rPr lang="en-US" sz="1000" b="1" dirty="0">
+                <a:latin typeface="Courier"/>
+              </a:rPr>
+              <a:t>    </a:t>
+            </a:r>
+            <a:r>
+              <a:rPr lang="en-US" sz="1000" b="1" dirty="0" err="1">
+                <a:latin typeface="Courier"/>
+              </a:rPr>
+              <a:t>obj</a:t>
+            </a:r>
+            <a:r>
+              <a:rPr lang="en-US" sz="1000" b="1" dirty="0">
+                <a:latin typeface="Courier"/>
+              </a:rPr>
+              <a:t>:	</a:t>
+            </a:r>
+            <a:r>
+              <a:rPr lang="en-US" sz="1000" b="1" dirty="0" err="1">
+                <a:latin typeface="Courier"/>
+              </a:rPr>
+              <a:t>xret</a:t>
+            </a:r>
+            <a:r>
+              <a:rPr lang="en-US" sz="1000" b="1" dirty="0">
+                <a:latin typeface="Courier"/>
+              </a:rPr>
+              <a:t> := "</a:t>
+            </a:r>
+            <a:r>
+              <a:rPr lang="en-US" sz="1000" b="1" dirty="0" err="1">
+                <a:latin typeface="Courier"/>
+              </a:rPr>
+              <a:t>i</a:t>
+            </a:r>
+            <a:r>
+              <a:rPr lang="en-US" sz="1000" b="1" dirty="0">
+                <a:latin typeface="Courier"/>
+              </a:rPr>
+              <a:t>__</a:t>
+            </a:r>
+            <a:r>
+              <a:rPr lang="en-US" sz="1000" b="1" dirty="0" err="1">
+                <a:latin typeface="Courier"/>
+              </a:rPr>
+              <a:t>toObject</a:t>
+            </a:r>
+            <a:r>
+              <a:rPr lang="en-US" sz="1000" b="1" dirty="0">
+                <a:latin typeface="Courier"/>
+              </a:rPr>
+              <a:t>" (</a:t>
+            </a:r>
+            <a:r>
+              <a:rPr lang="en-US" sz="1000" b="1" dirty="0" err="1">
+                <a:latin typeface="Courier"/>
+              </a:rPr>
+              <a:t>vthis</a:t>
+            </a:r>
+            <a:r>
+              <a:rPr lang="en-US" sz="1000" b="1" dirty="0">
+                <a:latin typeface="Courier"/>
+              </a:rPr>
+              <a:t>) with </a:t>
+            </a:r>
+            <a:r>
+              <a:rPr lang="en-US" sz="1000" b="1" dirty="0" err="1">
+                <a:latin typeface="Courier"/>
+              </a:rPr>
+              <a:t>elab</a:t>
+            </a:r>
+            <a:r>
+              <a:rPr lang="en-US" sz="1000" b="1" dirty="0">
+                <a:latin typeface="Courier"/>
+              </a:rPr>
+              <a:t>;</a:t>
+            </a:r>
+          </a:p>
+          <a:p>
+            <a:pPr>
+              <a:lnSpc>
+                <a:spcPct val="120000"/>
+              </a:lnSpc>
+              <a:spcBef>
+                <a:spcPts val="0"/>
+              </a:spcBef>
+              <a:spcAft>
+                <a:spcPts val="0"/>
+              </a:spcAft>
+            </a:pPr>
+            <a:r>
+              <a:rPr lang="en-US" sz="1000" b="1" dirty="0">
+                <a:latin typeface="Courier"/>
+              </a:rPr>
+              <a:t>	</a:t>
+            </a:r>
+          </a:p>
+          <a:p>
+            <a:pPr>
+              <a:lnSpc>
+                <a:spcPct val="120000"/>
+              </a:lnSpc>
+              <a:spcBef>
+                <a:spcPts val="0"/>
+              </a:spcBef>
+              <a:spcAft>
+                <a:spcPts val="0"/>
+              </a:spcAft>
+            </a:pPr>
+            <a:r>
+              <a:rPr lang="en-US" sz="1000" b="1" dirty="0">
+                <a:latin typeface="Courier"/>
+              </a:rPr>
+              <a:t>    rep:	v := [v, "@proto"];</a:t>
+            </a:r>
+          </a:p>
+          <a:p>
+            <a:pPr>
+              <a:lnSpc>
+                <a:spcPct val="120000"/>
+              </a:lnSpc>
+              <a:spcBef>
+                <a:spcPts val="0"/>
+              </a:spcBef>
+              <a:spcAft>
+                <a:spcPts val="0"/>
+              </a:spcAft>
+            </a:pPr>
+            <a:r>
+              <a:rPr lang="en-US" sz="1000" b="1" dirty="0">
+                <a:latin typeface="Courier"/>
+              </a:rPr>
+              <a:t>	</a:t>
+            </a:r>
+            <a:r>
+              <a:rPr lang="en-US" sz="1000" b="1" dirty="0" err="1">
+                <a:latin typeface="Courier"/>
+              </a:rPr>
+              <a:t>goto</a:t>
+            </a:r>
+            <a:r>
+              <a:rPr lang="en-US" sz="1000" b="1" dirty="0">
+                <a:latin typeface="Courier"/>
+              </a:rPr>
+              <a:t> [v = $$null] fret </a:t>
+            </a:r>
+            <a:r>
+              <a:rPr lang="en-US" sz="1000" b="1" dirty="0" err="1">
+                <a:latin typeface="Courier"/>
+              </a:rPr>
+              <a:t>nnull</a:t>
+            </a:r>
+            <a:r>
+              <a:rPr lang="en-US" sz="1000" b="1" dirty="0">
+                <a:latin typeface="Courier"/>
+              </a:rPr>
+              <a:t>;</a:t>
+            </a:r>
+          </a:p>
+          <a:p>
+            <a:pPr>
+              <a:lnSpc>
+                <a:spcPct val="120000"/>
+              </a:lnSpc>
+              <a:spcBef>
+                <a:spcPts val="0"/>
+              </a:spcBef>
+              <a:spcAft>
+                <a:spcPts val="0"/>
+              </a:spcAft>
+            </a:pPr>
+            <a:r>
+              <a:rPr lang="en-US" sz="1000" b="1" dirty="0">
+                <a:latin typeface="Courier"/>
+              </a:rPr>
+              <a:t>		</a:t>
+            </a:r>
+          </a:p>
+          <a:p>
+            <a:pPr>
+              <a:lnSpc>
+                <a:spcPct val="120000"/>
+              </a:lnSpc>
+              <a:spcBef>
+                <a:spcPts val="0"/>
+              </a:spcBef>
+              <a:spcAft>
+                <a:spcPts val="0"/>
+              </a:spcAft>
+            </a:pPr>
+            <a:r>
+              <a:rPr lang="en-US" sz="1000" b="1" dirty="0">
+                <a:latin typeface="Courier"/>
+              </a:rPr>
+              <a:t>	</a:t>
+            </a:r>
+            <a:r>
+              <a:rPr lang="en-US" sz="1000" b="1" dirty="0" err="1">
+                <a:latin typeface="Courier"/>
+              </a:rPr>
+              <a:t>nnull</a:t>
+            </a:r>
+            <a:r>
+              <a:rPr lang="en-US" sz="1000" b="1" dirty="0">
+                <a:latin typeface="Courier"/>
+              </a:rPr>
+              <a:t>:      </a:t>
+            </a:r>
+            <a:r>
+              <a:rPr lang="en-US" sz="1000" b="1" dirty="0" err="1">
+                <a:latin typeface="Courier"/>
+              </a:rPr>
+              <a:t>goto</a:t>
+            </a:r>
+            <a:r>
+              <a:rPr lang="en-US" sz="1000" b="1" dirty="0">
+                <a:latin typeface="Courier"/>
+              </a:rPr>
+              <a:t> [v = </a:t>
+            </a:r>
+            <a:r>
+              <a:rPr lang="en-US" sz="1000" b="1" dirty="0" err="1">
+                <a:latin typeface="Courier"/>
+              </a:rPr>
+              <a:t>xret</a:t>
+            </a:r>
+            <a:r>
+              <a:rPr lang="en-US" sz="1000" b="1" dirty="0">
+                <a:latin typeface="Courier"/>
+              </a:rPr>
+              <a:t>] </a:t>
+            </a:r>
+            <a:r>
+              <a:rPr lang="en-US" sz="1000" b="1" dirty="0" err="1">
+                <a:latin typeface="Courier"/>
+              </a:rPr>
+              <a:t>tret</a:t>
+            </a:r>
+            <a:r>
+              <a:rPr lang="en-US" sz="1000" b="1" dirty="0">
+                <a:latin typeface="Courier"/>
+              </a:rPr>
+              <a:t> rep;</a:t>
+            </a:r>
+          </a:p>
+          <a:p>
+            <a:pPr>
+              <a:lnSpc>
+                <a:spcPct val="120000"/>
+              </a:lnSpc>
+              <a:spcBef>
+                <a:spcPts val="0"/>
+              </a:spcBef>
+              <a:spcAft>
+                <a:spcPts val="0"/>
+              </a:spcAft>
+            </a:pPr>
+            <a:r>
+              <a:rPr lang="en-US" sz="1000" b="1" dirty="0">
+                <a:latin typeface="Courier"/>
+              </a:rPr>
+              <a:t>	</a:t>
+            </a:r>
+          </a:p>
+          <a:p>
+            <a:pPr>
+              <a:lnSpc>
+                <a:spcPct val="120000"/>
+              </a:lnSpc>
+              <a:spcBef>
+                <a:spcPts val="0"/>
+              </a:spcBef>
+              <a:spcAft>
+                <a:spcPts val="0"/>
+              </a:spcAft>
+            </a:pPr>
+            <a:r>
+              <a:rPr lang="en-US" sz="1000" b="1" dirty="0">
+                <a:latin typeface="Courier"/>
+              </a:rPr>
+              <a:t>	</a:t>
+            </a:r>
+            <a:r>
+              <a:rPr lang="en-US" sz="1000" b="1" dirty="0" err="1">
+                <a:latin typeface="Courier"/>
+              </a:rPr>
+              <a:t>tret</a:t>
+            </a:r>
+            <a:r>
+              <a:rPr lang="en-US" sz="1000" b="1" dirty="0">
+                <a:latin typeface="Courier"/>
+              </a:rPr>
+              <a:t>: 	</a:t>
+            </a:r>
+            <a:r>
+              <a:rPr lang="en-US" sz="1000" b="1" dirty="0" err="1">
+                <a:latin typeface="Courier"/>
+              </a:rPr>
+              <a:t>xret</a:t>
+            </a:r>
+            <a:r>
+              <a:rPr lang="en-US" sz="1000" b="1" dirty="0">
+                <a:latin typeface="Courier"/>
+              </a:rPr>
+              <a:t> := $$t;</a:t>
+            </a:r>
+          </a:p>
+          <a:p>
+            <a:pPr>
+              <a:lnSpc>
+                <a:spcPct val="120000"/>
+              </a:lnSpc>
+              <a:spcBef>
+                <a:spcPts val="0"/>
+              </a:spcBef>
+              <a:spcAft>
+                <a:spcPts val="0"/>
+              </a:spcAft>
+            </a:pPr>
+            <a:r>
+              <a:rPr lang="en-US" sz="1000" b="1" dirty="0">
+                <a:latin typeface="Courier"/>
+              </a:rPr>
+              <a:t>		</a:t>
+            </a:r>
+            <a:r>
+              <a:rPr lang="en-US" sz="1000" b="1" dirty="0" err="1">
+                <a:latin typeface="Courier"/>
+              </a:rPr>
+              <a:t>goto</a:t>
+            </a:r>
+            <a:r>
+              <a:rPr lang="en-US" sz="1000" b="1" dirty="0">
+                <a:latin typeface="Courier"/>
+              </a:rPr>
+              <a:t> </a:t>
+            </a:r>
+            <a:r>
+              <a:rPr lang="en-US" sz="1000" b="1" dirty="0" err="1">
+                <a:latin typeface="Courier"/>
+              </a:rPr>
+              <a:t>rlab</a:t>
+            </a:r>
+            <a:r>
+              <a:rPr lang="en-US" sz="1000" b="1" dirty="0">
+                <a:latin typeface="Courier"/>
+              </a:rPr>
+              <a:t>;</a:t>
+            </a:r>
+          </a:p>
+          <a:p>
+            <a:pPr>
+              <a:lnSpc>
+                <a:spcPct val="120000"/>
+              </a:lnSpc>
+              <a:spcBef>
+                <a:spcPts val="0"/>
+              </a:spcBef>
+              <a:spcAft>
+                <a:spcPts val="0"/>
+              </a:spcAft>
+            </a:pPr>
+            <a:r>
+              <a:rPr lang="en-US" sz="1000" b="1" dirty="0">
+                <a:latin typeface="Courier"/>
+              </a:rPr>
+              <a:t>	</a:t>
+            </a:r>
+          </a:p>
+          <a:p>
+            <a:pPr>
+              <a:lnSpc>
+                <a:spcPct val="120000"/>
+              </a:lnSpc>
+              <a:spcBef>
+                <a:spcPts val="0"/>
+              </a:spcBef>
+              <a:spcAft>
+                <a:spcPts val="0"/>
+              </a:spcAft>
+            </a:pPr>
+            <a:r>
+              <a:rPr lang="en-US" sz="1000" b="1" dirty="0">
+                <a:latin typeface="Courier"/>
+              </a:rPr>
+              <a:t>	fret: 	</a:t>
+            </a:r>
+            <a:r>
+              <a:rPr lang="en-US" sz="1000" b="1" dirty="0" err="1">
+                <a:latin typeface="Courier"/>
+              </a:rPr>
+              <a:t>xret</a:t>
+            </a:r>
+            <a:r>
+              <a:rPr lang="en-US" sz="1000" b="1" dirty="0">
+                <a:latin typeface="Courier"/>
+              </a:rPr>
+              <a:t> := $$f;</a:t>
+            </a:r>
+          </a:p>
+          <a:p>
+            <a:pPr>
+              <a:lnSpc>
+                <a:spcPct val="120000"/>
+              </a:lnSpc>
+              <a:spcBef>
+                <a:spcPts val="0"/>
+              </a:spcBef>
+              <a:spcAft>
+                <a:spcPts val="0"/>
+              </a:spcAft>
+            </a:pPr>
+            <a:r>
+              <a:rPr lang="en-US" sz="1000" b="1" dirty="0">
+                <a:latin typeface="Courier"/>
+              </a:rPr>
+              <a:t>	</a:t>
+            </a:r>
+          </a:p>
+          <a:p>
+            <a:pPr>
+              <a:lnSpc>
+                <a:spcPct val="120000"/>
+              </a:lnSpc>
+              <a:spcBef>
+                <a:spcPts val="0"/>
+              </a:spcBef>
+              <a:spcAft>
+                <a:spcPts val="0"/>
+              </a:spcAft>
+            </a:pPr>
+            <a:r>
+              <a:rPr lang="en-US" sz="1000" b="1" dirty="0">
+                <a:latin typeface="Courier"/>
+              </a:rPr>
+              <a:t>	</a:t>
+            </a:r>
+            <a:r>
+              <a:rPr lang="en-US" sz="1000" b="1" dirty="0" err="1">
+                <a:latin typeface="Courier"/>
+              </a:rPr>
+              <a:t>rlab</a:t>
+            </a:r>
+            <a:r>
+              <a:rPr lang="en-US" sz="1000" b="1" dirty="0">
+                <a:latin typeface="Courier"/>
+              </a:rPr>
+              <a:t>:	skip;</a:t>
+            </a:r>
+          </a:p>
+          <a:p>
+            <a:pPr>
+              <a:lnSpc>
+                <a:spcPct val="120000"/>
+              </a:lnSpc>
+              <a:spcBef>
+                <a:spcPts val="0"/>
+              </a:spcBef>
+              <a:spcAft>
+                <a:spcPts val="0"/>
+              </a:spcAft>
+            </a:pPr>
+            <a:r>
+              <a:rPr lang="en-US" sz="1000" b="1" dirty="0">
+                <a:latin typeface="Courier"/>
+              </a:rPr>
+              <a:t>	</a:t>
+            </a:r>
+            <a:r>
+              <a:rPr lang="en-US" sz="1000" b="1" dirty="0" err="1">
+                <a:latin typeface="Courier"/>
+              </a:rPr>
+              <a:t>elab</a:t>
+            </a:r>
+            <a:r>
+              <a:rPr lang="en-US" sz="1000" b="1" dirty="0">
+                <a:latin typeface="Courier"/>
+              </a:rPr>
+              <a:t>:	skip</a:t>
+            </a:r>
+          </a:p>
+          <a:p>
+            <a:pPr>
+              <a:lnSpc>
+                <a:spcPct val="120000"/>
+              </a:lnSpc>
+              <a:spcBef>
+                <a:spcPts val="0"/>
+              </a:spcBef>
+              <a:spcAft>
+                <a:spcPts val="0"/>
+              </a:spcAft>
+            </a:pPr>
+            <a:r>
+              <a:rPr lang="en-US" sz="1000" b="1" dirty="0">
+                <a:latin typeface="Courier"/>
+              </a:rPr>
+              <a:t>}</a:t>
+            </a:r>
+          </a:p>
+          <a:p>
+            <a:pPr>
+              <a:lnSpc>
+                <a:spcPct val="120000"/>
+              </a:lnSpc>
+              <a:spcBef>
+                <a:spcPts val="0"/>
+              </a:spcBef>
+              <a:spcAft>
+                <a:spcPts val="0"/>
+              </a:spcAft>
+            </a:pPr>
+            <a:r>
+              <a:rPr lang="en-US" sz="1000" b="1" dirty="0">
+                <a:latin typeface="Courier"/>
+              </a:rPr>
+              <a:t>with</a:t>
+            </a:r>
+          </a:p>
+          <a:p>
+            <a:pPr>
+              <a:lnSpc>
+                <a:spcPct val="120000"/>
+              </a:lnSpc>
+              <a:spcBef>
+                <a:spcPts val="0"/>
+              </a:spcBef>
+              <a:spcAft>
+                <a:spcPts val="0"/>
+              </a:spcAft>
+            </a:pPr>
+            <a:r>
+              <a:rPr lang="en-US" sz="1000" b="1" dirty="0">
+                <a:latin typeface="Courier"/>
+              </a:rPr>
+              <a:t>{</a:t>
+            </a:r>
+          </a:p>
+          <a:p>
+            <a:pPr>
+              <a:lnSpc>
+                <a:spcPct val="120000"/>
+              </a:lnSpc>
+              <a:spcBef>
+                <a:spcPts val="0"/>
+              </a:spcBef>
+              <a:spcAft>
+                <a:spcPts val="0"/>
+              </a:spcAft>
+            </a:pPr>
+            <a:r>
+              <a:rPr lang="en-US" sz="1000" b="1" dirty="0">
+                <a:latin typeface="Courier"/>
+              </a:rPr>
+              <a:t>	ret:	</a:t>
+            </a:r>
+            <a:r>
+              <a:rPr lang="en-US" sz="1000" b="1" dirty="0" err="1">
+                <a:latin typeface="Courier"/>
+              </a:rPr>
+              <a:t>xret</a:t>
+            </a:r>
+            <a:r>
+              <a:rPr lang="en-US" sz="1000" b="1" dirty="0">
+                <a:latin typeface="Courier"/>
+              </a:rPr>
+              <a:t>, </a:t>
+            </a:r>
+            <a:r>
+              <a:rPr lang="en-US" sz="1000" b="1" dirty="0" err="1">
+                <a:latin typeface="Courier"/>
+              </a:rPr>
+              <a:t>rlab</a:t>
+            </a:r>
+            <a:r>
+              <a:rPr lang="en-US" sz="1000" b="1" dirty="0">
+                <a:latin typeface="Courier"/>
+              </a:rPr>
+              <a:t>;</a:t>
+            </a:r>
+          </a:p>
+          <a:p>
+            <a:pPr>
+              <a:lnSpc>
+                <a:spcPct val="120000"/>
+              </a:lnSpc>
+              <a:spcBef>
+                <a:spcPts val="0"/>
+              </a:spcBef>
+              <a:spcAft>
+                <a:spcPts val="0"/>
+              </a:spcAft>
+            </a:pPr>
+            <a:r>
+              <a:rPr lang="en-US" sz="1000" b="1" dirty="0">
+                <a:latin typeface="Courier"/>
+              </a:rPr>
+              <a:t>	err:	</a:t>
+            </a:r>
+            <a:r>
+              <a:rPr lang="en-US" sz="1000" b="1" dirty="0" err="1">
+                <a:latin typeface="Courier"/>
+              </a:rPr>
+              <a:t>xret</a:t>
+            </a:r>
+            <a:r>
+              <a:rPr lang="en-US" sz="1000" b="1" dirty="0">
+                <a:latin typeface="Courier"/>
+              </a:rPr>
+              <a:t>, </a:t>
+            </a:r>
+            <a:r>
+              <a:rPr lang="en-US" sz="1000" b="1" dirty="0" err="1">
+                <a:latin typeface="Courier"/>
+              </a:rPr>
+              <a:t>elab</a:t>
+            </a:r>
+            <a:r>
+              <a:rPr lang="en-US" sz="1000" b="1" dirty="0">
+                <a:latin typeface="Courier"/>
+              </a:rPr>
+              <a:t>;</a:t>
+            </a:r>
+          </a:p>
+          <a:p>
+            <a:pPr>
+              <a:lnSpc>
+                <a:spcPct val="120000"/>
+              </a:lnSpc>
+              <a:spcBef>
+                <a:spcPts val="0"/>
+              </a:spcBef>
+              <a:spcAft>
+                <a:spcPts val="0"/>
+              </a:spcAft>
+            </a:pPr>
+            <a:r>
+              <a:rPr lang="en-US" sz="1000" b="1" dirty="0">
+                <a:latin typeface="Courier"/>
+              </a:rPr>
+              <a:t>};</a:t>
+            </a:r>
           </a:p>
         </p:txBody>
       </p:sp>
     </p:spTree>
     <p:extLst>
       <p:ext uri="{BB962C8B-B14F-4D97-AF65-F5344CB8AC3E}">
-        <p14:creationId xmlns:p14="http://schemas.microsoft.com/office/powerpoint/2010/main" val="1921277994"/>
+        <p14:creationId xmlns:p14="http://schemas.microsoft.com/office/powerpoint/2010/main" val="1748528465"/>
       </p:ext>
     </p:extLst>
   </p:cSld>
@@ -8409,9 +9541,170 @@
   <p:timing>
     <p:tnLst>
       <p:par>
-        <p:cTn id="1" dur="indefinite" restart="never" nodeType="tmRoot"/>
+        <p:cTn id="1" dur="indefinite" restart="never" nodeType="tmRoot">
+          <p:childTnLst>
+            <p:seq concurrent="1" nextAc="seek">
+              <p:cTn id="2" dur="indefinite" nodeType="mainSeq">
+                <p:childTnLst>
+                  <p:par>
+                    <p:cTn id="3" fill="hold">
+                      <p:stCondLst>
+                        <p:cond delay="indefinite"/>
+                      </p:stCondLst>
+                      <p:childTnLst>
+                        <p:par>
+                          <p:cTn id="4" fill="hold">
+                            <p:stCondLst>
+                              <p:cond delay="0"/>
+                            </p:stCondLst>
+                            <p:childTnLst>
+                              <p:par>
+                                <p:cTn id="5" presetID="1" presetClass="entr" presetSubtype="0" fill="hold" nodeType="clickEffect">
+                                  <p:stCondLst>
+                                    <p:cond delay="0"/>
+                                  </p:stCondLst>
+                                  <p:childTnLst>
+                                    <p:set>
+                                      <p:cBhvr>
+                                        <p:cTn id="6" dur="1" fill="hold">
+                                          <p:stCondLst>
+                                            <p:cond delay="0"/>
+                                          </p:stCondLst>
+                                        </p:cTn>
+                                        <p:tgtEl>
+                                          <p:spTgt spid="5"/>
+                                        </p:tgtEl>
+                                        <p:attrNameLst>
+                                          <p:attrName>style.visibility</p:attrName>
+                                        </p:attrNameLst>
+                                      </p:cBhvr>
+                                      <p:to>
+                                        <p:strVal val="visible"/>
+                                      </p:to>
+                                    </p:set>
+                                  </p:childTnLst>
+                                </p:cTn>
+                              </p:par>
+                            </p:childTnLst>
+                          </p:cTn>
+                        </p:par>
+                      </p:childTnLst>
+                    </p:cTn>
+                  </p:par>
+                  <p:par>
+                    <p:cTn id="7" fill="hold">
+                      <p:stCondLst>
+                        <p:cond delay="indefinite"/>
+                      </p:stCondLst>
+                      <p:childTnLst>
+                        <p:par>
+                          <p:cTn id="8" fill="hold">
+                            <p:stCondLst>
+                              <p:cond delay="0"/>
+                            </p:stCondLst>
+                            <p:childTnLst>
+                              <p:par>
+                                <p:cTn id="9" presetID="1" presetClass="exit" presetSubtype="0" fill="hold" nodeType="clickEffect">
+                                  <p:stCondLst>
+                                    <p:cond delay="0"/>
+                                  </p:stCondLst>
+                                  <p:childTnLst>
+                                    <p:set>
+                                      <p:cBhvr>
+                                        <p:cTn id="10" dur="1" fill="hold">
+                                          <p:stCondLst>
+                                            <p:cond delay="0"/>
+                                          </p:stCondLst>
+                                        </p:cTn>
+                                        <p:tgtEl>
+                                          <p:spTgt spid="5"/>
+                                        </p:tgtEl>
+                                        <p:attrNameLst>
+                                          <p:attrName>style.visibility</p:attrName>
+                                        </p:attrNameLst>
+                                      </p:cBhvr>
+                                      <p:to>
+                                        <p:strVal val="hidden"/>
+                                      </p:to>
+                                    </p:set>
+                                  </p:childTnLst>
+                                </p:cTn>
+                              </p:par>
+                            </p:childTnLst>
+                          </p:cTn>
+                        </p:par>
+                      </p:childTnLst>
+                    </p:cTn>
+                  </p:par>
+                  <p:par>
+                    <p:cTn id="11" fill="hold">
+                      <p:stCondLst>
+                        <p:cond delay="indefinite"/>
+                      </p:stCondLst>
+                      <p:childTnLst>
+                        <p:par>
+                          <p:cTn id="12" fill="hold">
+                            <p:stCondLst>
+                              <p:cond delay="0"/>
+                            </p:stCondLst>
+                            <p:childTnLst>
+                              <p:par>
+                                <p:cTn id="13" presetID="1" presetClass="entr" presetSubtype="0" fill="hold" grpId="0" nodeType="clickEffect">
+                                  <p:stCondLst>
+                                    <p:cond delay="0"/>
+                                  </p:stCondLst>
+                                  <p:childTnLst>
+                                    <p:set>
+                                      <p:cBhvr>
+                                        <p:cTn id="14" dur="1" fill="hold">
+                                          <p:stCondLst>
+                                            <p:cond delay="0"/>
+                                          </p:stCondLst>
+                                        </p:cTn>
+                                        <p:tgtEl>
+                                          <p:spTgt spid="6"/>
+                                        </p:tgtEl>
+                                        <p:attrNameLst>
+                                          <p:attrName>style.visibility</p:attrName>
+                                        </p:attrNameLst>
+                                      </p:cBhvr>
+                                      <p:to>
+                                        <p:strVal val="visible"/>
+                                      </p:to>
+                                    </p:set>
+                                  </p:childTnLst>
+                                </p:cTn>
+                              </p:par>
+                            </p:childTnLst>
+                          </p:cTn>
+                        </p:par>
+                      </p:childTnLst>
+                    </p:cTn>
+                  </p:par>
+                </p:childTnLst>
+              </p:cTn>
+              <p:prevCondLst>
+                <p:cond evt="onPrev" delay="0">
+                  <p:tgtEl>
+                    <p:sldTgt/>
+                  </p:tgtEl>
+                </p:cond>
+              </p:prevCondLst>
+              <p:nextCondLst>
+                <p:cond evt="onNext" delay="0">
+                  <p:tgtEl>
+                    <p:sldTgt/>
+                  </p:tgtEl>
+                </p:cond>
+              </p:nextCondLst>
+            </p:seq>
+          </p:childTnLst>
+        </p:cTn>
       </p:par>
     </p:tnLst>
+    <p:bldLst>
+      <p:bldP spid="6" grpId="0"/>
+    </p:bldLst>
   </p:timing>
 </p:sld>
 </file>
@@ -8449,18 +9742,13 @@
           <a:lstStyle/>
           <a:p>
             <a:r>
-              <a:rPr lang="en-US" b="1" u="sng" dirty="0" smtClean="0">
+              <a:rPr lang="en-US" b="1" u="sng" dirty="0">
                 <a:solidFill>
                   <a:schemeClr val="accent2"/>
                 </a:solidFill>
               </a:rPr>
               <a:t>Coverage</a:t>
             </a:r>
-            <a:endParaRPr lang="en-US" b="1" u="sng" dirty="0">
-              <a:solidFill>
-                <a:schemeClr val="accent2"/>
-              </a:solidFill>
-            </a:endParaRPr>
           </a:p>
         </p:txBody>
       </p:sp>
@@ -8471,7 +9759,7 @@
             <a:spLocks noGrp="1"/>
           </p:cNvSpPr>
           <p:nvPr>
-            <p:ph idx="1"/>
+            <p:ph sz="half" idx="1"/>
           </p:nvPr>
         </p:nvSpPr>
         <p:spPr/>
@@ -8480,23 +9768,42 @@
           <a:lstStyle/>
           <a:p>
             <a:r>
-              <a:rPr lang="en-US" dirty="0" smtClean="0"/>
+              <a:rPr lang="en-US" dirty="0"/>
               <a:t>What has been done</a:t>
             </a:r>
           </a:p>
           <a:p>
             <a:r>
-              <a:rPr lang="en-US" dirty="0" smtClean="0"/>
+              <a:rPr lang="en-US" dirty="0"/>
               <a:t>How? Standard, bit of </a:t>
             </a:r>
             <a:r>
-              <a:rPr lang="en-US" dirty="0" err="1" smtClean="0"/>
+              <a:rPr lang="en-US" dirty="0" err="1"/>
               <a:t>opsem</a:t>
             </a:r>
-            <a:endParaRPr lang="en-US" dirty="0" smtClean="0"/>
-          </a:p>
-          <a:p>
-            <a:endParaRPr lang="en-US" dirty="0" smtClean="0"/>
+            <a:endParaRPr lang="en-US" dirty="0"/>
+          </a:p>
+          <a:p>
+            <a:endParaRPr lang="en-US" dirty="0"/>
+          </a:p>
+        </p:txBody>
+      </p:sp>
+      <p:sp>
+        <p:nvSpPr>
+          <p:cNvPr id="4" name="Content Placeholder 3"/>
+          <p:cNvSpPr>
+            <a:spLocks noGrp="1"/>
+          </p:cNvSpPr>
+          <p:nvPr>
+            <p:ph sz="half" idx="2"/>
+          </p:nvPr>
+        </p:nvSpPr>
+        <p:spPr/>
+        <p:txBody>
+          <a:bodyPr/>
+          <a:lstStyle/>
+          <a:p>
+            <a:endParaRPr lang="en-US"/>
           </a:p>
         </p:txBody>
       </p:sp>
@@ -8510,13 +9817,6 @@
   <p:clrMapOvr>
     <a:masterClrMapping/>
   </p:clrMapOvr>
-  <p:timing>
-    <p:tnLst>
-      <p:par>
-        <p:cTn id="1" dur="indefinite" restart="never" nodeType="tmRoot"/>
-      </p:par>
-    </p:tnLst>
-  </p:timing>
 </p:sld>
 </file>
 

</xml_diff>